<commit_message>
Accelerated Algorithmic Trading Demo
</commit_message>
<xml_diff>
--- a/lecture/AAT.pptx
+++ b/lecture/AAT.pptx
@@ -5,10 +5,10 @@
     <p:sldMasterId id="2147483649" r:id="rId1"/>
   </p:sldMasterIdLst>
   <p:notesMasterIdLst>
-    <p:notesMasterId r:id="rId28"/>
+    <p:notesMasterId r:id="rId30"/>
   </p:notesMasterIdLst>
   <p:handoutMasterIdLst>
-    <p:handoutMasterId r:id="rId29"/>
+    <p:handoutMasterId r:id="rId31"/>
   </p:handoutMasterIdLst>
   <p:sldIdLst>
     <p:sldId id="268" r:id="rId2"/>
@@ -29,14 +29,16 @@
     <p:sldId id="1497" r:id="rId17"/>
     <p:sldId id="1467" r:id="rId18"/>
     <p:sldId id="1485" r:id="rId19"/>
-    <p:sldId id="1498" r:id="rId20"/>
-    <p:sldId id="1468" r:id="rId21"/>
-    <p:sldId id="1493" r:id="rId22"/>
-    <p:sldId id="1494" r:id="rId23"/>
-    <p:sldId id="1501" r:id="rId24"/>
-    <p:sldId id="1500" r:id="rId25"/>
-    <p:sldId id="1469" r:id="rId26"/>
-    <p:sldId id="1499" r:id="rId27"/>
+    <p:sldId id="1503" r:id="rId20"/>
+    <p:sldId id="1498" r:id="rId21"/>
+    <p:sldId id="1468" r:id="rId22"/>
+    <p:sldId id="1493" r:id="rId23"/>
+    <p:sldId id="1494" r:id="rId24"/>
+    <p:sldId id="1501" r:id="rId25"/>
+    <p:sldId id="1500" r:id="rId26"/>
+    <p:sldId id="1502" r:id="rId27"/>
+    <p:sldId id="1504" r:id="rId28"/>
+    <p:sldId id="1499" r:id="rId29"/>
   </p:sldIdLst>
   <p:sldSz cx="13004800" cy="9753600"/>
   <p:notesSz cx="6797675" cy="9928225"/>
@@ -5200,6 +5202,132 @@
           </a:p>
         </p:txBody>
       </p:sp>
+      <p:sp>
+        <p:nvSpPr>
+          <p:cNvPr id="15" name="文字方塊 14"/>
+          <p:cNvSpPr txBox="1"/>
+          <p:nvPr/>
+        </p:nvSpPr>
+        <p:spPr>
+          <a:xfrm>
+            <a:off x="6142360" y="7987660"/>
+            <a:ext cx="6336978" cy="1569660"/>
+          </a:xfrm>
+          <a:prstGeom prst="rect">
+            <a:avLst/>
+          </a:prstGeom>
+          <a:noFill/>
+        </p:spPr>
+        <p:txBody>
+          <a:bodyPr wrap="square" rtlCol="0">
+            <a:spAutoFit/>
+          </a:bodyPr>
+          <a:lstStyle/>
+          <a:p>
+            <a:pPr algn="just"/>
+            <a:r>
+              <a:rPr lang="en-US" sz="1600" dirty="0" smtClean="0"/>
+              <a:t>If </a:t>
+            </a:r>
+            <a:r>
+              <a:rPr lang="en-US" sz="1600" dirty="0"/>
+              <a:t>the stream data type is an user-defined </a:t>
+            </a:r>
+            <a:r>
+              <a:rPr lang="en-US" sz="1600" dirty="0" err="1"/>
+              <a:t>struct</a:t>
+            </a:r>
+            <a:r>
+              <a:rPr lang="en-US" sz="1600" dirty="0"/>
+              <a:t>, the default procedure is to keep the </a:t>
+            </a:r>
+            <a:r>
+              <a:rPr lang="en-US" sz="1600" dirty="0" err="1"/>
+              <a:t>struct</a:t>
+            </a:r>
+            <a:r>
+              <a:rPr lang="en-US" sz="1600" dirty="0"/>
+              <a:t> aggregated and </a:t>
+            </a:r>
+            <a:r>
+              <a:rPr lang="en-US" sz="1600" dirty="0">
+                <a:solidFill>
+                  <a:srgbClr val="FF0000"/>
+                </a:solidFill>
+              </a:rPr>
+              <a:t>align the </a:t>
+            </a:r>
+            <a:r>
+              <a:rPr lang="en-US" sz="1600" dirty="0" err="1">
+                <a:solidFill>
+                  <a:srgbClr val="FF0000"/>
+                </a:solidFill>
+              </a:rPr>
+              <a:t>struct</a:t>
+            </a:r>
+            <a:r>
+              <a:rPr lang="en-US" sz="1600" dirty="0">
+                <a:solidFill>
+                  <a:srgbClr val="FF0000"/>
+                </a:solidFill>
+              </a:rPr>
+              <a:t> to the size of the largest data element to the nearest byte</a:t>
+            </a:r>
+            <a:r>
+              <a:rPr lang="en-US" sz="1600" dirty="0">
+                <a:solidFill>
+                  <a:schemeClr val="tx1"/>
+                </a:solidFill>
+              </a:rPr>
+              <a:t>.</a:t>
+            </a:r>
+            <a:r>
+              <a:rPr lang="en-US" sz="1600" dirty="0"/>
+              <a:t> The only exception to this rule is if the </a:t>
+            </a:r>
+            <a:r>
+              <a:rPr lang="en-US" sz="1600" dirty="0" err="1"/>
+              <a:t>struct</a:t>
+            </a:r>
+            <a:r>
+              <a:rPr lang="en-US" sz="1600" dirty="0"/>
+              <a:t> contains a </a:t>
+            </a:r>
+            <a:r>
+              <a:rPr lang="en-US" sz="1600" dirty="0" err="1"/>
+              <a:t>hls</a:t>
+            </a:r>
+            <a:r>
+              <a:rPr lang="en-US" sz="1600" dirty="0"/>
+              <a:t>::stream object. In this special case, the </a:t>
+            </a:r>
+            <a:r>
+              <a:rPr lang="en-US" sz="1600" dirty="0" err="1"/>
+              <a:t>struct</a:t>
+            </a:r>
+            <a:r>
+              <a:rPr lang="en-US" sz="1600" dirty="0"/>
+              <a:t> will be disaggregated and an </a:t>
+            </a:r>
+            <a:r>
+              <a:rPr lang="en-US" sz="1600" dirty="0" err="1"/>
+              <a:t>axi</a:t>
+            </a:r>
+            <a:r>
+              <a:rPr lang="en-US" sz="1600" dirty="0"/>
+              <a:t> stream will be created for each member element of the </a:t>
+            </a:r>
+            <a:r>
+              <a:rPr lang="en-US" sz="1600" dirty="0" err="1"/>
+              <a:t>struct</a:t>
+            </a:r>
+            <a:r>
+              <a:rPr lang="en-US" sz="1600" dirty="0"/>
+              <a:t>.</a:t>
+            </a:r>
+          </a:p>
+        </p:txBody>
+      </p:sp>
     </p:spTree>
     <p:extLst>
       <p:ext uri="{BB962C8B-B14F-4D97-AF65-F5344CB8AC3E}">
@@ -5450,7 +5578,7 @@
         </p:nvSpPr>
         <p:spPr bwMode="auto">
           <a:xfrm>
-            <a:off x="2541960" y="7685855"/>
+            <a:off x="2528898" y="7698175"/>
             <a:ext cx="6480720" cy="432048"/>
           </a:xfrm>
           <a:prstGeom prst="rect">
@@ -7688,11 +7816,14 @@
           <a:lstStyle/>
           <a:p>
             <a:r>
-              <a:rPr lang="en-US" altLang="zh-TW" dirty="0">
-                <a:ea typeface="標楷體" panose="03000509000000000000" pitchFamily="65" charset="-120"/>
-              </a:rPr>
-              <a:t>Interfaces</a:t>
-            </a:r>
+              <a:rPr lang="en-US" altLang="zh-TW" dirty="0" err="1">
+                <a:ea typeface="標楷體" panose="03000509000000000000" pitchFamily="65" charset="-120"/>
+              </a:rPr>
+              <a:t>Datamover</a:t>
+            </a:r>
+            <a:endParaRPr lang="en-US" altLang="zh-TW" dirty="0">
+              <a:ea typeface="標楷體" panose="03000509000000000000" pitchFamily="65" charset="-120"/>
+            </a:endParaRPr>
           </a:p>
         </p:txBody>
       </p:sp>
@@ -7717,84 +7848,10 @@
           <a:bodyPr/>
           <a:lstStyle/>
           <a:p>
-            <a:r>
-              <a:rPr lang="en-US" altLang="zh-TW" b="0" dirty="0" smtClean="0">
-                <a:ea typeface="標楷體" panose="03000509000000000000" pitchFamily="65" charset="-120"/>
-              </a:rPr>
-              <a:t>Read/Write kernel register</a:t>
-            </a:r>
-          </a:p>
-          <a:p>
-            <a:pPr lvl="1"/>
-            <a:r>
-              <a:rPr lang="en-US" altLang="zh-TW" dirty="0">
-                <a:ea typeface="標楷體" panose="03000509000000000000" pitchFamily="65" charset="-120"/>
-              </a:rPr>
-              <a:t>#pragma </a:t>
-            </a:r>
-            <a:r>
-              <a:rPr lang="en-US" dirty="0" smtClean="0"/>
-              <a:t>HLS </a:t>
-            </a:r>
-            <a:r>
-              <a:rPr lang="en-US" dirty="0"/>
-              <a:t>INTERFACE </a:t>
-            </a:r>
-            <a:r>
-              <a:rPr lang="en-US" dirty="0" err="1" smtClean="0"/>
-              <a:t>s_axilite</a:t>
-            </a:r>
-            <a:r>
-              <a:rPr lang="en-US" dirty="0" smtClean="0"/>
-              <a:t> port=_______</a:t>
-            </a:r>
-            <a:endParaRPr lang="en-US" dirty="0"/>
-          </a:p>
-          <a:p>
-            <a:r>
-              <a:rPr lang="en-US" altLang="zh-TW" b="0" dirty="0">
-                <a:ea typeface="標楷體" panose="03000509000000000000" pitchFamily="65" charset="-120"/>
-              </a:rPr>
-              <a:t>Streaming Interface between kernels</a:t>
-            </a:r>
-          </a:p>
-          <a:p>
-            <a:pPr lvl="1"/>
-            <a:r>
-              <a:rPr lang="en-US" altLang="zh-TW" dirty="0">
-                <a:ea typeface="標楷體" panose="03000509000000000000" pitchFamily="65" charset="-120"/>
-              </a:rPr>
-              <a:t>#pragma HLS INTERFACE </a:t>
-            </a:r>
-            <a:r>
-              <a:rPr lang="en-US" altLang="zh-TW" dirty="0" err="1">
-                <a:ea typeface="標楷體" panose="03000509000000000000" pitchFamily="65" charset="-120"/>
-              </a:rPr>
-              <a:t>ap_ctrl_none</a:t>
-            </a:r>
-            <a:r>
-              <a:rPr lang="en-US" altLang="zh-TW" dirty="0">
-                <a:ea typeface="標楷體" panose="03000509000000000000" pitchFamily="65" charset="-120"/>
-              </a:rPr>
-              <a:t> port=return</a:t>
-            </a:r>
-          </a:p>
-          <a:p>
-            <a:r>
-              <a:rPr lang="en-US" altLang="zh-TW" b="0" dirty="0" smtClean="0">
-                <a:ea typeface="標楷體" panose="03000509000000000000" pitchFamily="65" charset="-120"/>
-              </a:rPr>
-              <a:t>Streaming data to kernel</a:t>
-            </a:r>
-          </a:p>
-          <a:p>
-            <a:pPr lvl="1"/>
-            <a:r>
-              <a:rPr lang="en-US" altLang="zh-TW" dirty="0">
-                <a:ea typeface="標楷體" panose="03000509000000000000" pitchFamily="65" charset="-120"/>
-              </a:rPr>
-              <a:t>Buffer map API</a:t>
-            </a:r>
+            <a:pPr algn="just"/>
+            <a:endParaRPr lang="en-US" altLang="zh-TW" sz="2000" b="0" dirty="0">
+              <a:ea typeface="標楷體" panose="03000509000000000000" pitchFamily="65" charset="-120"/>
+            </a:endParaRPr>
           </a:p>
         </p:txBody>
       </p:sp>
@@ -7828,71 +7885,55 @@
           </a:p>
         </p:txBody>
       </p:sp>
-      <p:sp>
-        <p:nvSpPr>
-          <p:cNvPr id="5" name="矩形 4"/>
-          <p:cNvSpPr/>
+      <p:pic>
+        <p:nvPicPr>
+          <p:cNvPr id="6" name="圖片 5"/>
+          <p:cNvPicPr>
+            <a:picLocks noChangeAspect="1"/>
+          </p:cNvPicPr>
           <p:nvPr/>
-        </p:nvSpPr>
+        </p:nvPicPr>
+        <p:blipFill rotWithShape="1">
+          <a:blip r:embed="rId2"/>
+          <a:srcRect l="52727" t="74084" r="1818" b="4055"/>
+          <a:stretch/>
+        </p:blipFill>
         <p:spPr>
           <a:xfrm>
-            <a:off x="457200" y="8340441"/>
-            <a:ext cx="11604128" cy="1015663"/>
+            <a:off x="3621882" y="1447180"/>
+            <a:ext cx="5672136" cy="2041969"/>
           </a:xfrm>
           <a:prstGeom prst="rect">
             <a:avLst/>
           </a:prstGeom>
         </p:spPr>
-        <p:txBody>
-          <a:bodyPr wrap="square">
-            <a:spAutoFit/>
-          </a:bodyPr>
-          <a:lstStyle/>
-          <a:p>
-            <a:r>
-              <a:rPr lang="en-US" sz="2000" dirty="0" smtClean="0"/>
-              <a:t>Reference: </a:t>
-            </a:r>
-            <a:r>
-              <a:rPr lang="en-US" sz="2000" dirty="0" smtClean="0">
-                <a:hlinkClick r:id="rId2"/>
-              </a:rPr>
-              <a:t>https</a:t>
-            </a:r>
-            <a:r>
-              <a:rPr lang="en-US" sz="2000" dirty="0">
-                <a:hlinkClick r:id="rId2"/>
-              </a:rPr>
-              <a:t>://</a:t>
-            </a:r>
-            <a:r>
-              <a:rPr lang="en-US" sz="2000" dirty="0" smtClean="0">
-                <a:hlinkClick r:id="rId2"/>
-              </a:rPr>
-              <a:t>github.com/Xilinx/Vitis_Accel_Examples/tree/master/host_xrt/streaming_free_running_k2k_xrt</a:t>
-            </a:r>
-            <a:endParaRPr lang="en-US" sz="2000" dirty="0" smtClean="0"/>
-          </a:p>
-          <a:p>
-            <a:r>
-              <a:rPr lang="en-US" sz="2000" dirty="0">
-                <a:hlinkClick r:id="rId3"/>
-              </a:rPr>
-              <a:t>https://</a:t>
-            </a:r>
-            <a:r>
-              <a:rPr lang="en-US" sz="2000" dirty="0" smtClean="0">
-                <a:hlinkClick r:id="rId3"/>
-              </a:rPr>
-              <a:t>xilinx.github.io/XRT/2021.2/html/xrt_native_apis.html</a:t>
-            </a:r>
-            <a:endParaRPr lang="en-US" sz="2000" dirty="0"/>
-          </a:p>
-        </p:txBody>
-      </p:sp>
+      </p:pic>
       <p:pic>
         <p:nvPicPr>
-          <p:cNvPr id="6" name="圖片 5"/>
+          <p:cNvPr id="7" name="圖片 6"/>
+          <p:cNvPicPr>
+            <a:picLocks noChangeAspect="1"/>
+          </p:cNvPicPr>
+          <p:nvPr/>
+        </p:nvPicPr>
+        <p:blipFill rotWithShape="1">
+          <a:blip r:embed="rId3"/>
+          <a:srcRect b="62201"/>
+          <a:stretch/>
+        </p:blipFill>
+        <p:spPr>
+          <a:xfrm>
+            <a:off x="2429175" y="3727091"/>
+            <a:ext cx="8057550" cy="1440000"/>
+          </a:xfrm>
+          <a:prstGeom prst="rect">
+            <a:avLst/>
+          </a:prstGeom>
+        </p:spPr>
+      </p:pic>
+      <p:pic>
+        <p:nvPicPr>
+          <p:cNvPr id="8" name="圖片 7"/>
           <p:cNvPicPr>
             <a:picLocks noChangeAspect="1"/>
           </p:cNvPicPr>
@@ -7906,47 +7947,146 @@
         </p:blipFill>
         <p:spPr>
           <a:xfrm>
-            <a:off x="4691011" y="6184989"/>
-            <a:ext cx="6653602" cy="2051267"/>
+            <a:off x="1630244" y="5444729"/>
+            <a:ext cx="9655411" cy="3960000"/>
           </a:xfrm>
           <a:prstGeom prst="rect">
             <a:avLst/>
           </a:prstGeom>
         </p:spPr>
       </p:pic>
-      <p:pic>
-        <p:nvPicPr>
-          <p:cNvPr id="9" name="圖片 8"/>
-          <p:cNvPicPr>
-            <a:picLocks noChangeAspect="1"/>
-          </p:cNvPicPr>
+      <p:sp>
+        <p:nvSpPr>
+          <p:cNvPr id="5" name="矩形 4"/>
+          <p:cNvSpPr/>
           <p:nvPr/>
-        </p:nvPicPr>
-        <p:blipFill>
-          <a:blip r:embed="rId5"/>
-          <a:stretch>
-            <a:fillRect/>
-          </a:stretch>
-        </p:blipFill>
-        <p:spPr>
-          <a:xfrm>
-            <a:off x="4691011" y="4449134"/>
-            <a:ext cx="5296639" cy="1476581"/>
+        </p:nvSpPr>
+        <p:spPr bwMode="auto">
+          <a:xfrm>
+            <a:off x="5062240" y="4833257"/>
+            <a:ext cx="5184576" cy="274320"/>
           </a:xfrm>
           <a:prstGeom prst="rect">
             <a:avLst/>
           </a:prstGeom>
-          <a:ln>
+          <a:noFill/>
+          <a:ln w="57150" cap="flat" cmpd="sng" algn="ctr">
             <a:solidFill>
-              <a:schemeClr val="tx1"/>
+              <a:srgbClr val="FF0000"/>
             </a:solidFill>
+            <a:prstDash val="solid"/>
+            <a:round/>
+            <a:headEnd type="none" w="med" len="med"/>
+            <a:tailEnd type="none" w="med" len="med"/>
           </a:ln>
-        </p:spPr>
-      </p:pic>
+          <a:effectLst/>
+        </p:spPr>
+        <p:txBody>
+          <a:bodyPr vert="horz" wrap="square" lIns="91440" tIns="45720" rIns="91440" bIns="45720" numCol="1" rtlCol="0" anchor="t" anchorCtr="0" compatLnSpc="1">
+            <a:prstTxWarp prst="textNoShape">
+              <a:avLst/>
+            </a:prstTxWarp>
+          </a:bodyPr>
+          <a:lstStyle/>
+          <a:p>
+            <a:pPr marL="0" marR="0" indent="0" algn="l" defTabSz="914400" rtl="0" eaLnBrk="1" fontAlgn="base" latinLnBrk="0" hangingPunct="1">
+              <a:lnSpc>
+                <a:spcPct val="100000"/>
+              </a:lnSpc>
+              <a:spcBef>
+                <a:spcPct val="0"/>
+              </a:spcBef>
+              <a:spcAft>
+                <a:spcPct val="0"/>
+              </a:spcAft>
+              <a:buClrTx/>
+              <a:buSzTx/>
+              <a:buFontTx/>
+              <a:buNone/>
+              <a:tabLst/>
+            </a:pPr>
+            <a:endParaRPr kumimoji="0" lang="en-US" sz="2400" b="0" i="0" u="none" strike="noStrike" cap="none" normalizeH="0" baseline="0" smtClean="0">
+              <a:ln>
+                <a:noFill/>
+              </a:ln>
+              <a:solidFill>
+                <a:srgbClr val="000000"/>
+              </a:solidFill>
+              <a:effectLst/>
+              <a:latin typeface="Arial" charset="0"/>
+              <a:sym typeface="Arial" charset="0"/>
+            </a:endParaRPr>
+          </a:p>
+        </p:txBody>
+      </p:sp>
+      <p:sp>
+        <p:nvSpPr>
+          <p:cNvPr id="9" name="矩形 8"/>
+          <p:cNvSpPr/>
+          <p:nvPr/>
+        </p:nvSpPr>
+        <p:spPr bwMode="auto">
+          <a:xfrm>
+            <a:off x="4715263" y="6343085"/>
+            <a:ext cx="5976664" cy="288033"/>
+          </a:xfrm>
+          <a:prstGeom prst="rect">
+            <a:avLst/>
+          </a:prstGeom>
+          <a:noFill/>
+          <a:ln w="57150" cap="flat" cmpd="sng" algn="ctr">
+            <a:solidFill>
+              <a:srgbClr val="FF0000"/>
+            </a:solidFill>
+            <a:prstDash val="solid"/>
+            <a:round/>
+            <a:headEnd type="none" w="med" len="med"/>
+            <a:tailEnd type="none" w="med" len="med"/>
+          </a:ln>
+          <a:effectLst/>
+        </p:spPr>
+        <p:txBody>
+          <a:bodyPr vert="horz" wrap="square" lIns="91440" tIns="45720" rIns="91440" bIns="45720" numCol="1" rtlCol="0" anchor="t" anchorCtr="0" compatLnSpc="1">
+            <a:prstTxWarp prst="textNoShape">
+              <a:avLst/>
+            </a:prstTxWarp>
+          </a:bodyPr>
+          <a:lstStyle/>
+          <a:p>
+            <a:pPr marL="0" marR="0" indent="0" algn="l" defTabSz="914400" rtl="0" eaLnBrk="1" fontAlgn="base" latinLnBrk="0" hangingPunct="1">
+              <a:lnSpc>
+                <a:spcPct val="100000"/>
+              </a:lnSpc>
+              <a:spcBef>
+                <a:spcPct val="0"/>
+              </a:spcBef>
+              <a:spcAft>
+                <a:spcPct val="0"/>
+              </a:spcAft>
+              <a:buClrTx/>
+              <a:buSzTx/>
+              <a:buFontTx/>
+              <a:buNone/>
+              <a:tabLst/>
+            </a:pPr>
+            <a:endParaRPr kumimoji="0" lang="en-US" sz="2400" b="0" i="0" u="none" strike="noStrike" cap="none" normalizeH="0" baseline="0" smtClean="0">
+              <a:ln>
+                <a:noFill/>
+              </a:ln>
+              <a:solidFill>
+                <a:srgbClr val="000000"/>
+              </a:solidFill>
+              <a:effectLst/>
+              <a:latin typeface="Arial" charset="0"/>
+              <a:sym typeface="Arial" charset="0"/>
+            </a:endParaRPr>
+          </a:p>
+        </p:txBody>
+      </p:sp>
     </p:spTree>
     <p:extLst>
       <p:ext uri="{BB962C8B-B14F-4D97-AF65-F5344CB8AC3E}">
-        <p14:creationId xmlns:p14="http://schemas.microsoft.com/office/powerpoint/2010/main" val="1479133151"/>
+        <p14:creationId xmlns:p14="http://schemas.microsoft.com/office/powerpoint/2010/main" val="2523725342"/>
       </p:ext>
     </p:extLst>
   </p:cSld>
@@ -7990,51 +8130,51 @@
           <a:lstStyle/>
           <a:p>
             <a:r>
-              <a:rPr lang="en-US" altLang="zh-TW" dirty="0" smtClean="0">
+              <a:rPr lang="en-US" altLang="zh-TW" dirty="0">
                 <a:ea typeface="標楷體" panose="03000509000000000000" pitchFamily="65" charset="-120"/>
               </a:rPr>
               <a:t>System</a:t>
             </a:r>
             <a:r>
-              <a:rPr lang="zh-TW" altLang="en-US" dirty="0" smtClean="0">
+              <a:rPr lang="zh-TW" altLang="en-US" dirty="0">
                 <a:ea typeface="標楷體" panose="03000509000000000000" pitchFamily="65" charset="-120"/>
               </a:rPr>
               <a:t> </a:t>
             </a:r>
             <a:r>
-              <a:rPr lang="en-US" altLang="zh-TW" dirty="0" smtClean="0">
+              <a:rPr lang="en-US" altLang="zh-TW" dirty="0">
                 <a:ea typeface="標楷體" panose="03000509000000000000" pitchFamily="65" charset="-120"/>
               </a:rPr>
               <a:t>Overview</a:t>
+            </a:r>
+          </a:p>
+          <a:p>
+            <a:r>
+              <a:rPr lang="en-US" altLang="zh-TW" dirty="0">
+                <a:ea typeface="標楷體" panose="03000509000000000000" pitchFamily="65" charset="-120"/>
+              </a:rPr>
+              <a:t>Kernel Functions Overview</a:t>
+            </a:r>
+          </a:p>
+          <a:p>
+            <a:pPr lvl="1"/>
+            <a:r>
+              <a:rPr lang="en-US" altLang="zh-TW" dirty="0" err="1">
+                <a:ea typeface="標楷體" panose="03000509000000000000" pitchFamily="65" charset="-120"/>
+              </a:rPr>
+              <a:t>FeedHandler</a:t>
             </a:r>
             <a:endParaRPr lang="en-US" altLang="zh-TW" dirty="0">
               <a:ea typeface="標楷體" panose="03000509000000000000" pitchFamily="65" charset="-120"/>
             </a:endParaRPr>
           </a:p>
           <a:p>
-            <a:r>
-              <a:rPr lang="en-US" altLang="zh-TW" dirty="0">
-                <a:ea typeface="標楷體" panose="03000509000000000000" pitchFamily="65" charset="-120"/>
-              </a:rPr>
-              <a:t>Kernel </a:t>
-            </a:r>
-            <a:r>
-              <a:rPr lang="en-US" altLang="zh-TW" dirty="0" smtClean="0">
-                <a:ea typeface="標楷體" panose="03000509000000000000" pitchFamily="65" charset="-120"/>
-              </a:rPr>
-              <a:t>Functions </a:t>
-            </a:r>
-            <a:r>
-              <a:rPr lang="en-US" altLang="zh-TW" dirty="0">
-                <a:ea typeface="標楷體" panose="03000509000000000000" pitchFamily="65" charset="-120"/>
-              </a:rPr>
-              <a:t>O</a:t>
-            </a:r>
-            <a:r>
-              <a:rPr lang="en-US" altLang="zh-TW" dirty="0" smtClean="0">
-                <a:ea typeface="標楷體" panose="03000509000000000000" pitchFamily="65" charset="-120"/>
-              </a:rPr>
-              <a:t>verview</a:t>
+            <a:pPr lvl="1"/>
+            <a:r>
+              <a:rPr lang="en-US" altLang="zh-TW" dirty="0" err="1">
+                <a:ea typeface="標楷體" panose="03000509000000000000" pitchFamily="65" charset="-120"/>
+              </a:rPr>
+              <a:t>OrderBook</a:t>
             </a:r>
             <a:endParaRPr lang="en-US" altLang="zh-TW" dirty="0">
               <a:ea typeface="標楷體" panose="03000509000000000000" pitchFamily="65" charset="-120"/>
@@ -8046,7 +8186,7 @@
               <a:rPr lang="en-US" altLang="zh-TW" dirty="0" err="1">
                 <a:ea typeface="標楷體" panose="03000509000000000000" pitchFamily="65" charset="-120"/>
               </a:rPr>
-              <a:t>FeedHandler</a:t>
+              <a:t>PriceEngine</a:t>
             </a:r>
             <a:endParaRPr lang="en-US" altLang="zh-TW" dirty="0">
               <a:ea typeface="標楷體" panose="03000509000000000000" pitchFamily="65" charset="-120"/>
@@ -8058,53 +8198,38 @@
               <a:rPr lang="en-US" altLang="zh-TW" dirty="0" err="1">
                 <a:ea typeface="標楷體" panose="03000509000000000000" pitchFamily="65" charset="-120"/>
               </a:rPr>
-              <a:t>OrderBook</a:t>
+              <a:t>OrderEntry</a:t>
             </a:r>
             <a:endParaRPr lang="en-US" altLang="zh-TW" dirty="0">
               <a:ea typeface="標楷體" panose="03000509000000000000" pitchFamily="65" charset="-120"/>
             </a:endParaRPr>
           </a:p>
           <a:p>
-            <a:pPr lvl="1"/>
             <a:r>
               <a:rPr lang="en-US" altLang="zh-TW" dirty="0" err="1">
                 <a:ea typeface="標楷體" panose="03000509000000000000" pitchFamily="65" charset="-120"/>
               </a:rPr>
-              <a:t>PriceEngine</a:t>
+              <a:t>Datamover</a:t>
             </a:r>
             <a:endParaRPr lang="en-US" altLang="zh-TW" dirty="0">
               <a:ea typeface="標楷體" panose="03000509000000000000" pitchFamily="65" charset="-120"/>
             </a:endParaRPr>
           </a:p>
           <a:p>
+            <a:r>
+              <a:rPr lang="en-US" altLang="zh-TW" dirty="0">
+                <a:ea typeface="標楷體" panose="03000509000000000000" pitchFamily="65" charset="-120"/>
+              </a:rPr>
+              <a:t>Interfaces</a:t>
+            </a:r>
+          </a:p>
+          <a:p>
             <a:pPr lvl="1"/>
             <a:r>
-              <a:rPr lang="en-US" altLang="zh-TW" dirty="0" err="1">
-                <a:ea typeface="標楷體" panose="03000509000000000000" pitchFamily="65" charset="-120"/>
-              </a:rPr>
-              <a:t>OrderEntry</a:t>
-            </a:r>
-            <a:endParaRPr lang="en-US" altLang="zh-TW" dirty="0">
-              <a:ea typeface="標楷體" panose="03000509000000000000" pitchFamily="65" charset="-120"/>
-            </a:endParaRPr>
-          </a:p>
-          <a:p>
-            <a:r>
-              <a:rPr lang="en-US" altLang="zh-TW" dirty="0" err="1" smtClean="0">
-                <a:ea typeface="標楷體" panose="03000509000000000000" pitchFamily="65" charset="-120"/>
-              </a:rPr>
-              <a:t>Datamover</a:t>
-            </a:r>
-            <a:endParaRPr lang="en-US" altLang="zh-TW" dirty="0" smtClean="0">
-              <a:ea typeface="標楷體" panose="03000509000000000000" pitchFamily="65" charset="-120"/>
-            </a:endParaRPr>
-          </a:p>
-          <a:p>
-            <a:r>
               <a:rPr lang="en-US" altLang="zh-TW" dirty="0">
                 <a:ea typeface="標楷體" panose="03000509000000000000" pitchFamily="65" charset="-120"/>
               </a:rPr>
-              <a:t>Interfaces</a:t>
+              <a:t>Host -&gt; kernel (FPGA)</a:t>
             </a:r>
           </a:p>
           <a:p>
@@ -8113,64 +8238,32 @@
               <a:rPr lang="en-US" altLang="zh-TW" dirty="0">
                 <a:ea typeface="標楷體" panose="03000509000000000000" pitchFamily="65" charset="-120"/>
               </a:rPr>
-              <a:t>Host -&gt; kernel (FPGA)</a:t>
-            </a:r>
-          </a:p>
-          <a:p>
-            <a:pPr lvl="1"/>
+              <a:t>Streaming Interface between kernels</a:t>
+            </a:r>
+          </a:p>
+          <a:p>
             <a:r>
               <a:rPr lang="en-US" altLang="zh-TW" dirty="0">
                 <a:ea typeface="標楷體" panose="03000509000000000000" pitchFamily="65" charset="-120"/>
               </a:rPr>
-              <a:t>Streaming Interface between </a:t>
-            </a:r>
-            <a:r>
-              <a:rPr lang="en-US" altLang="zh-TW" dirty="0" smtClean="0">
-                <a:ea typeface="標楷體" panose="03000509000000000000" pitchFamily="65" charset="-120"/>
-              </a:rPr>
-              <a:t>kernels</a:t>
-            </a:r>
-            <a:endParaRPr lang="en-US" altLang="zh-TW" dirty="0">
-              <a:ea typeface="標楷體" panose="03000509000000000000" pitchFamily="65" charset="-120"/>
-            </a:endParaRPr>
-          </a:p>
-          <a:p>
-            <a:r>
-              <a:rPr lang="en-US" altLang="zh-TW" dirty="0" smtClean="0">
-                <a:ea typeface="標楷體" panose="03000509000000000000" pitchFamily="65" charset="-120"/>
-              </a:rPr>
-              <a:t>Verification </a:t>
-            </a:r>
-            <a:r>
-              <a:rPr lang="en-US" altLang="zh-TW" dirty="0" smtClean="0">
-                <a:ea typeface="標楷體" panose="03000509000000000000" pitchFamily="65" charset="-120"/>
-              </a:rPr>
-              <a:t>System</a:t>
-            </a:r>
-          </a:p>
-          <a:p>
-            <a:r>
-              <a:rPr lang="en-US" altLang="zh-TW" dirty="0" smtClean="0">
+              <a:t>Verification System</a:t>
+            </a:r>
+          </a:p>
+          <a:p>
+            <a:r>
+              <a:rPr lang="en-US" altLang="zh-TW" dirty="0">
                 <a:ea typeface="標楷體" panose="03000509000000000000" pitchFamily="65" charset="-120"/>
               </a:rPr>
               <a:t>Host Program</a:t>
             </a:r>
-            <a:endParaRPr lang="en-US" altLang="zh-TW" dirty="0" smtClean="0">
-              <a:ea typeface="標楷體" panose="03000509000000000000" pitchFamily="65" charset="-120"/>
-            </a:endParaRPr>
-          </a:p>
-          <a:p>
-            <a:r>
-              <a:rPr lang="en-US" altLang="zh-TW" dirty="0" smtClean="0">
+          </a:p>
+          <a:p>
+            <a:r>
+              <a:rPr lang="en-US" altLang="zh-TW" dirty="0">
                 <a:ea typeface="標楷體" panose="03000509000000000000" pitchFamily="65" charset="-120"/>
               </a:rPr>
               <a:t>Lab</a:t>
             </a:r>
-            <a:endParaRPr lang="en-US" altLang="zh-TW" dirty="0">
-              <a:latin typeface="Times New Roman" panose="02020603050405020304" pitchFamily="18" charset="0"/>
-              <a:ea typeface="標楷體" panose="03000509000000000000" pitchFamily="65" charset="-120"/>
-              <a:cs typeface="Times New Roman" panose="02020603050405020304" pitchFamily="18" charset="0"/>
-            </a:endParaRPr>
           </a:p>
         </p:txBody>
       </p:sp>
@@ -8277,7 +8370,109 @@
               <a:rPr lang="en-US" altLang="zh-TW" dirty="0">
                 <a:ea typeface="標楷體" panose="03000509000000000000" pitchFamily="65" charset="-120"/>
               </a:rPr>
-              <a:t>Verification System </a:t>
+              <a:t>Interfaces</a:t>
+            </a:r>
+          </a:p>
+        </p:txBody>
+      </p:sp>
+      <p:sp>
+        <p:nvSpPr>
+          <p:cNvPr id="3" name="內容版面配置區 2">
+            <a:extLst>
+              <a:ext uri="{FF2B5EF4-FFF2-40B4-BE49-F238E27FC236}">
+                <a16:creationId xmlns:a16="http://schemas.microsoft.com/office/drawing/2014/main" id="{EB7E6C77-ECDF-4E94-86C3-FC66F6D05EF7}"/>
+              </a:ext>
+            </a:extLst>
+          </p:cNvPr>
+          <p:cNvSpPr>
+            <a:spLocks noGrp="1"/>
+          </p:cNvSpPr>
+          <p:nvPr>
+            <p:ph idx="1"/>
+          </p:nvPr>
+        </p:nvSpPr>
+        <p:spPr/>
+        <p:txBody>
+          <a:bodyPr/>
+          <a:lstStyle/>
+          <a:p>
+            <a:r>
+              <a:rPr lang="en-US" altLang="zh-TW" b="0" dirty="0" smtClean="0">
+                <a:ea typeface="標楷體" panose="03000509000000000000" pitchFamily="65" charset="-120"/>
+              </a:rPr>
+              <a:t>Read/Write kernel register</a:t>
+            </a:r>
+          </a:p>
+          <a:p>
+            <a:pPr lvl="1"/>
+            <a:r>
+              <a:rPr lang="en-US" altLang="zh-TW" dirty="0">
+                <a:ea typeface="標楷體" panose="03000509000000000000" pitchFamily="65" charset="-120"/>
+              </a:rPr>
+              <a:t>#pragma </a:t>
+            </a:r>
+            <a:r>
+              <a:rPr lang="en-US" dirty="0" smtClean="0"/>
+              <a:t>HLS </a:t>
+            </a:r>
+            <a:r>
+              <a:rPr lang="en-US" dirty="0"/>
+              <a:t>INTERFACE </a:t>
+            </a:r>
+            <a:r>
+              <a:rPr lang="en-US" dirty="0" err="1" smtClean="0"/>
+              <a:t>s_axilite</a:t>
+            </a:r>
+            <a:r>
+              <a:rPr lang="en-US" dirty="0" smtClean="0"/>
+              <a:t> port=_______</a:t>
+            </a:r>
+            <a:endParaRPr lang="en-US" dirty="0"/>
+          </a:p>
+          <a:p>
+            <a:r>
+              <a:rPr lang="en-US" altLang="zh-TW" b="0" dirty="0">
+                <a:ea typeface="標楷體" panose="03000509000000000000" pitchFamily="65" charset="-120"/>
+              </a:rPr>
+              <a:t>Streaming Interface between kernels</a:t>
+            </a:r>
+          </a:p>
+          <a:p>
+            <a:pPr lvl="1"/>
+            <a:r>
+              <a:rPr lang="en-US" altLang="zh-TW" dirty="0">
+                <a:ea typeface="標楷體" panose="03000509000000000000" pitchFamily="65" charset="-120"/>
+              </a:rPr>
+              <a:t>#pragma HLS INTERFACE </a:t>
+            </a:r>
+            <a:r>
+              <a:rPr lang="en-US" altLang="zh-TW" dirty="0" err="1">
+                <a:ea typeface="標楷體" panose="03000509000000000000" pitchFamily="65" charset="-120"/>
+              </a:rPr>
+              <a:t>ap_ctrl_none</a:t>
+            </a:r>
+            <a:r>
+              <a:rPr lang="en-US" altLang="zh-TW" dirty="0">
+                <a:ea typeface="標楷體" panose="03000509000000000000" pitchFamily="65" charset="-120"/>
+              </a:rPr>
+              <a:t> port=return</a:t>
+            </a:r>
+          </a:p>
+          <a:p>
+            <a:r>
+              <a:rPr lang="en-US" altLang="zh-TW" b="0" dirty="0" smtClean="0">
+                <a:ea typeface="標楷體" panose="03000509000000000000" pitchFamily="65" charset="-120"/>
+              </a:rPr>
+              <a:t>Streaming data to kernel</a:t>
+            </a:r>
+          </a:p>
+          <a:p>
+            <a:pPr lvl="1"/>
+            <a:r>
+              <a:rPr lang="en-US" altLang="zh-TW" dirty="0">
+                <a:ea typeface="標楷體" panose="03000509000000000000" pitchFamily="65" charset="-120"/>
+              </a:rPr>
+              <a:t>Buffer map API</a:t>
             </a:r>
           </a:p>
         </p:txBody>
@@ -8307,6 +8502,212 @@
               <a:rPr lang="zh-TW" altLang="en-US" smtClean="0"/>
               <a:pPr/>
               <a:t>20</a:t>
+            </a:fld>
+            <a:endParaRPr lang="en-US" altLang="zh-TW" dirty="0"/>
+          </a:p>
+        </p:txBody>
+      </p:sp>
+      <p:sp>
+        <p:nvSpPr>
+          <p:cNvPr id="5" name="矩形 4"/>
+          <p:cNvSpPr/>
+          <p:nvPr/>
+        </p:nvSpPr>
+        <p:spPr>
+          <a:xfrm>
+            <a:off x="457200" y="8340441"/>
+            <a:ext cx="11604128" cy="1015663"/>
+          </a:xfrm>
+          <a:prstGeom prst="rect">
+            <a:avLst/>
+          </a:prstGeom>
+        </p:spPr>
+        <p:txBody>
+          <a:bodyPr wrap="square">
+            <a:spAutoFit/>
+          </a:bodyPr>
+          <a:lstStyle/>
+          <a:p>
+            <a:r>
+              <a:rPr lang="en-US" sz="2000" dirty="0" smtClean="0"/>
+              <a:t>Reference: </a:t>
+            </a:r>
+            <a:r>
+              <a:rPr lang="en-US" sz="2000" dirty="0" smtClean="0">
+                <a:hlinkClick r:id="rId2"/>
+              </a:rPr>
+              <a:t>https</a:t>
+            </a:r>
+            <a:r>
+              <a:rPr lang="en-US" sz="2000" dirty="0">
+                <a:hlinkClick r:id="rId2"/>
+              </a:rPr>
+              <a:t>://</a:t>
+            </a:r>
+            <a:r>
+              <a:rPr lang="en-US" sz="2000" dirty="0" smtClean="0">
+                <a:hlinkClick r:id="rId2"/>
+              </a:rPr>
+              <a:t>github.com/Xilinx/Vitis_Accel_Examples/tree/master/host_xrt/streaming_free_running_k2k_xrt</a:t>
+            </a:r>
+            <a:endParaRPr lang="en-US" sz="2000" dirty="0" smtClean="0"/>
+          </a:p>
+          <a:p>
+            <a:r>
+              <a:rPr lang="en-US" sz="2000" dirty="0">
+                <a:hlinkClick r:id="rId3"/>
+              </a:rPr>
+              <a:t>https://</a:t>
+            </a:r>
+            <a:r>
+              <a:rPr lang="en-US" sz="2000" dirty="0" smtClean="0">
+                <a:hlinkClick r:id="rId3"/>
+              </a:rPr>
+              <a:t>xilinx.github.io/XRT/2021.2/html/xrt_native_apis.html</a:t>
+            </a:r>
+            <a:endParaRPr lang="en-US" sz="2000" dirty="0"/>
+          </a:p>
+        </p:txBody>
+      </p:sp>
+      <p:pic>
+        <p:nvPicPr>
+          <p:cNvPr id="6" name="圖片 5"/>
+          <p:cNvPicPr>
+            <a:picLocks noChangeAspect="1"/>
+          </p:cNvPicPr>
+          <p:nvPr/>
+        </p:nvPicPr>
+        <p:blipFill>
+          <a:blip r:embed="rId4"/>
+          <a:stretch>
+            <a:fillRect/>
+          </a:stretch>
+        </p:blipFill>
+        <p:spPr>
+          <a:xfrm>
+            <a:off x="4691011" y="6184989"/>
+            <a:ext cx="6653602" cy="2051267"/>
+          </a:xfrm>
+          <a:prstGeom prst="rect">
+            <a:avLst/>
+          </a:prstGeom>
+        </p:spPr>
+      </p:pic>
+      <p:pic>
+        <p:nvPicPr>
+          <p:cNvPr id="9" name="圖片 8"/>
+          <p:cNvPicPr>
+            <a:picLocks noChangeAspect="1"/>
+          </p:cNvPicPr>
+          <p:nvPr/>
+        </p:nvPicPr>
+        <p:blipFill>
+          <a:blip r:embed="rId5"/>
+          <a:stretch>
+            <a:fillRect/>
+          </a:stretch>
+        </p:blipFill>
+        <p:spPr>
+          <a:xfrm>
+            <a:off x="4691011" y="4449134"/>
+            <a:ext cx="5296639" cy="1476581"/>
+          </a:xfrm>
+          <a:prstGeom prst="rect">
+            <a:avLst/>
+          </a:prstGeom>
+          <a:ln>
+            <a:solidFill>
+              <a:schemeClr val="tx1"/>
+            </a:solidFill>
+          </a:ln>
+        </p:spPr>
+      </p:pic>
+    </p:spTree>
+    <p:extLst>
+      <p:ext uri="{BB962C8B-B14F-4D97-AF65-F5344CB8AC3E}">
+        <p14:creationId xmlns:p14="http://schemas.microsoft.com/office/powerpoint/2010/main" val="1479133151"/>
+      </p:ext>
+    </p:extLst>
+  </p:cSld>
+  <p:clrMapOvr>
+    <a:masterClrMapping/>
+  </p:clrMapOvr>
+  <p:transition/>
+</p:sld>
+</file>
+
+<file path=ppt/slides/slide21.xml><?xml version="1.0" encoding="utf-8"?>
+<p:sld xmlns:a="http://schemas.openxmlformats.org/drawingml/2006/main" xmlns:r="http://schemas.openxmlformats.org/officeDocument/2006/relationships" xmlns:p="http://schemas.openxmlformats.org/presentationml/2006/main">
+  <p:cSld>
+    <p:spTree>
+      <p:nvGrpSpPr>
+        <p:cNvPr id="1" name=""/>
+        <p:cNvGrpSpPr/>
+        <p:nvPr/>
+      </p:nvGrpSpPr>
+      <p:grpSpPr>
+        <a:xfrm>
+          <a:off x="0" y="0"/>
+          <a:ext cx="0" cy="0"/>
+          <a:chOff x="0" y="0"/>
+          <a:chExt cx="0" cy="0"/>
+        </a:xfrm>
+      </p:grpSpPr>
+      <p:sp>
+        <p:nvSpPr>
+          <p:cNvPr id="2" name="標題 1">
+            <a:extLst>
+              <a:ext uri="{FF2B5EF4-FFF2-40B4-BE49-F238E27FC236}">
+                <a16:creationId xmlns:a16="http://schemas.microsoft.com/office/drawing/2014/main" id="{DF590214-AB74-4E22-8A85-9C5D4C432A96}"/>
+              </a:ext>
+            </a:extLst>
+          </p:cNvPr>
+          <p:cNvSpPr>
+            <a:spLocks noGrp="1"/>
+          </p:cNvSpPr>
+          <p:nvPr>
+            <p:ph type="title"/>
+          </p:nvPr>
+        </p:nvSpPr>
+        <p:spPr/>
+        <p:txBody>
+          <a:bodyPr/>
+          <a:lstStyle/>
+          <a:p>
+            <a:r>
+              <a:rPr lang="en-US" altLang="zh-TW" dirty="0">
+                <a:ea typeface="標楷體" panose="03000509000000000000" pitchFamily="65" charset="-120"/>
+              </a:rPr>
+              <a:t>Verification System </a:t>
+            </a:r>
+          </a:p>
+        </p:txBody>
+      </p:sp>
+      <p:sp>
+        <p:nvSpPr>
+          <p:cNvPr id="4" name="投影片編號版面配置區 3">
+            <a:extLst>
+              <a:ext uri="{FF2B5EF4-FFF2-40B4-BE49-F238E27FC236}">
+                <a16:creationId xmlns:a16="http://schemas.microsoft.com/office/drawing/2014/main" id="{3B906199-CFB1-4D93-96DA-F79EF75407F2}"/>
+              </a:ext>
+            </a:extLst>
+          </p:cNvPr>
+          <p:cNvSpPr>
+            <a:spLocks noGrp="1"/>
+          </p:cNvSpPr>
+          <p:nvPr>
+            <p:ph type="sldNum" sz="quarter" idx="10"/>
+          </p:nvPr>
+        </p:nvSpPr>
+        <p:spPr/>
+        <p:txBody>
+          <a:bodyPr/>
+          <a:lstStyle/>
+          <a:p>
+            <a:fld id="{11B4AD68-C2A9-40CE-B4DE-8329351EC16B}" type="slidenum">
+              <a:rPr lang="zh-TW" altLang="en-US" smtClean="0"/>
+              <a:pPr/>
+              <a:t>21</a:t>
             </a:fld>
             <a:endParaRPr lang="en-US" altLang="zh-TW" dirty="0"/>
           </a:p>
@@ -8716,249 +9117,6 @@
 </p:sld>
 </file>
 
-<file path=ppt/slides/slide21.xml><?xml version="1.0" encoding="utf-8"?>
-<p:sld xmlns:a="http://schemas.openxmlformats.org/drawingml/2006/main" xmlns:r="http://schemas.openxmlformats.org/officeDocument/2006/relationships" xmlns:p="http://schemas.openxmlformats.org/presentationml/2006/main">
-  <p:cSld>
-    <p:spTree>
-      <p:nvGrpSpPr>
-        <p:cNvPr id="1" name=""/>
-        <p:cNvGrpSpPr/>
-        <p:nvPr/>
-      </p:nvGrpSpPr>
-      <p:grpSpPr>
-        <a:xfrm>
-          <a:off x="0" y="0"/>
-          <a:ext cx="0" cy="0"/>
-          <a:chOff x="0" y="0"/>
-          <a:chExt cx="0" cy="0"/>
-        </a:xfrm>
-      </p:grpSpPr>
-      <p:sp>
-        <p:nvSpPr>
-          <p:cNvPr id="2" name="標題 1">
-            <a:extLst>
-              <a:ext uri="{FF2B5EF4-FFF2-40B4-BE49-F238E27FC236}">
-                <a16:creationId xmlns:a16="http://schemas.microsoft.com/office/drawing/2014/main" id="{DF590214-AB74-4E22-8A85-9C5D4C432A96}"/>
-              </a:ext>
-            </a:extLst>
-          </p:cNvPr>
-          <p:cNvSpPr>
-            <a:spLocks noGrp="1"/>
-          </p:cNvSpPr>
-          <p:nvPr>
-            <p:ph type="title"/>
-          </p:nvPr>
-        </p:nvSpPr>
-        <p:spPr/>
-        <p:txBody>
-          <a:bodyPr/>
-          <a:lstStyle/>
-          <a:p>
-            <a:r>
-              <a:rPr lang="en-US" altLang="zh-TW" dirty="0">
-                <a:ea typeface="標楷體" panose="03000509000000000000" pitchFamily="65" charset="-120"/>
-              </a:rPr>
-              <a:t>Verification System </a:t>
-            </a:r>
-          </a:p>
-        </p:txBody>
-      </p:sp>
-      <p:sp>
-        <p:nvSpPr>
-          <p:cNvPr id="3" name="內容版面配置區 2">
-            <a:extLst>
-              <a:ext uri="{FF2B5EF4-FFF2-40B4-BE49-F238E27FC236}">
-                <a16:creationId xmlns:a16="http://schemas.microsoft.com/office/drawing/2014/main" id="{EB7E6C77-ECDF-4E94-86C3-FC66F6D05EF7}"/>
-              </a:ext>
-            </a:extLst>
-          </p:cNvPr>
-          <p:cNvSpPr>
-            <a:spLocks noGrp="1"/>
-          </p:cNvSpPr>
-          <p:nvPr>
-            <p:ph idx="1"/>
-          </p:nvPr>
-        </p:nvSpPr>
-        <p:spPr/>
-        <p:txBody>
-          <a:bodyPr/>
-          <a:lstStyle/>
-          <a:p>
-            <a:r>
-              <a:rPr lang="en-US" altLang="zh-TW" b="0" dirty="0" smtClean="0">
-                <a:ea typeface="標楷體" panose="03000509000000000000" pitchFamily="65" charset="-120"/>
-              </a:rPr>
-              <a:t>mm2s</a:t>
-            </a:r>
-            <a:r>
-              <a:rPr lang="zh-TW" altLang="en-US" b="0" dirty="0" smtClean="0">
-                <a:ea typeface="標楷體" panose="03000509000000000000" pitchFamily="65" charset="-120"/>
-              </a:rPr>
-              <a:t> </a:t>
-            </a:r>
-            <a:r>
-              <a:rPr lang="en-US" altLang="zh-TW" b="0" dirty="0" smtClean="0">
-                <a:ea typeface="標楷體" panose="03000509000000000000" pitchFamily="65" charset="-120"/>
-              </a:rPr>
-              <a:t>(</a:t>
-            </a:r>
-            <a:r>
-              <a:rPr lang="en-US" altLang="zh-TW" b="0" dirty="0" err="1" smtClean="0">
-                <a:ea typeface="標楷體" panose="03000509000000000000" pitchFamily="65" charset="-120"/>
-              </a:rPr>
-              <a:t>memRead</a:t>
-            </a:r>
-            <a:r>
-              <a:rPr lang="en-US" altLang="zh-TW" b="0" dirty="0" smtClean="0">
-                <a:ea typeface="標楷體" panose="03000509000000000000" pitchFamily="65" charset="-120"/>
-              </a:rPr>
-              <a:t>)</a:t>
-            </a:r>
-          </a:p>
-          <a:p>
-            <a:endParaRPr lang="en-US" altLang="zh-TW" b="0" dirty="0">
-              <a:ea typeface="標楷體" panose="03000509000000000000" pitchFamily="65" charset="-120"/>
-            </a:endParaRPr>
-          </a:p>
-          <a:p>
-            <a:endParaRPr lang="en-US" altLang="zh-TW" b="0" dirty="0" smtClean="0">
-              <a:ea typeface="標楷體" panose="03000509000000000000" pitchFamily="65" charset="-120"/>
-            </a:endParaRPr>
-          </a:p>
-          <a:p>
-            <a:endParaRPr lang="en-US" altLang="zh-TW" b="0" dirty="0">
-              <a:ea typeface="標楷體" panose="03000509000000000000" pitchFamily="65" charset="-120"/>
-            </a:endParaRPr>
-          </a:p>
-          <a:p>
-            <a:pPr marL="44450" indent="0">
-              <a:buNone/>
-            </a:pPr>
-            <a:endParaRPr lang="en-US" altLang="zh-TW" b="0" dirty="0">
-              <a:ea typeface="標楷體" panose="03000509000000000000" pitchFamily="65" charset="-120"/>
-            </a:endParaRPr>
-          </a:p>
-          <a:p>
-            <a:pPr>
-              <a:lnSpc>
-                <a:spcPct val="200000"/>
-              </a:lnSpc>
-            </a:pPr>
-            <a:r>
-              <a:rPr lang="en-US" altLang="zh-TW" b="0" dirty="0" smtClean="0">
-                <a:ea typeface="標楷體" panose="03000509000000000000" pitchFamily="65" charset="-120"/>
-              </a:rPr>
-              <a:t>S2mm (</a:t>
-            </a:r>
-            <a:r>
-              <a:rPr lang="en-US" altLang="zh-TW" b="0" dirty="0" err="1" smtClean="0">
-                <a:ea typeface="標楷體" panose="03000509000000000000" pitchFamily="65" charset="-120"/>
-              </a:rPr>
-              <a:t>memWrite</a:t>
-            </a:r>
-            <a:r>
-              <a:rPr lang="en-US" altLang="zh-TW" b="0" dirty="0" smtClean="0">
-                <a:ea typeface="標楷體" panose="03000509000000000000" pitchFamily="65" charset="-120"/>
-              </a:rPr>
-              <a:t>)</a:t>
-            </a:r>
-            <a:endParaRPr lang="en-US" altLang="zh-TW" b="0" dirty="0">
-              <a:ea typeface="標楷體" panose="03000509000000000000" pitchFamily="65" charset="-120"/>
-            </a:endParaRPr>
-          </a:p>
-        </p:txBody>
-      </p:sp>
-      <p:sp>
-        <p:nvSpPr>
-          <p:cNvPr id="4" name="投影片編號版面配置區 3">
-            <a:extLst>
-              <a:ext uri="{FF2B5EF4-FFF2-40B4-BE49-F238E27FC236}">
-                <a16:creationId xmlns:a16="http://schemas.microsoft.com/office/drawing/2014/main" id="{3B906199-CFB1-4D93-96DA-F79EF75407F2}"/>
-              </a:ext>
-            </a:extLst>
-          </p:cNvPr>
-          <p:cNvSpPr>
-            <a:spLocks noGrp="1"/>
-          </p:cNvSpPr>
-          <p:nvPr>
-            <p:ph type="sldNum" sz="quarter" idx="10"/>
-          </p:nvPr>
-        </p:nvSpPr>
-        <p:spPr/>
-        <p:txBody>
-          <a:bodyPr/>
-          <a:lstStyle/>
-          <a:p>
-            <a:fld id="{11B4AD68-C2A9-40CE-B4DE-8329351EC16B}" type="slidenum">
-              <a:rPr lang="zh-TW" altLang="en-US" smtClean="0"/>
-              <a:pPr/>
-              <a:t>21</a:t>
-            </a:fld>
-            <a:endParaRPr lang="en-US" altLang="zh-TW" dirty="0"/>
-          </a:p>
-        </p:txBody>
-      </p:sp>
-      <p:pic>
-        <p:nvPicPr>
-          <p:cNvPr id="13" name="圖片 12"/>
-          <p:cNvPicPr>
-            <a:picLocks noChangeAspect="1"/>
-          </p:cNvPicPr>
-          <p:nvPr/>
-        </p:nvPicPr>
-        <p:blipFill rotWithShape="1">
-          <a:blip r:embed="rId2"/>
-          <a:srcRect b="6626"/>
-          <a:stretch/>
-        </p:blipFill>
-        <p:spPr>
-          <a:xfrm>
-            <a:off x="3255514" y="1980559"/>
-            <a:ext cx="6430272" cy="2855311"/>
-          </a:xfrm>
-          <a:prstGeom prst="rect">
-            <a:avLst/>
-          </a:prstGeom>
-        </p:spPr>
-      </p:pic>
-      <p:pic>
-        <p:nvPicPr>
-          <p:cNvPr id="14" name="圖片 13"/>
-          <p:cNvPicPr>
-            <a:picLocks noChangeAspect="1"/>
-          </p:cNvPicPr>
-          <p:nvPr/>
-        </p:nvPicPr>
-        <p:blipFill>
-          <a:blip r:embed="rId3"/>
-          <a:stretch>
-            <a:fillRect/>
-          </a:stretch>
-        </p:blipFill>
-        <p:spPr>
-          <a:xfrm>
-            <a:off x="2861760" y="5524872"/>
-            <a:ext cx="7192379" cy="3229426"/>
-          </a:xfrm>
-          <a:prstGeom prst="rect">
-            <a:avLst/>
-          </a:prstGeom>
-        </p:spPr>
-      </p:pic>
-    </p:spTree>
-    <p:extLst>
-      <p:ext uri="{BB962C8B-B14F-4D97-AF65-F5344CB8AC3E}">
-        <p14:creationId xmlns:p14="http://schemas.microsoft.com/office/powerpoint/2010/main" val="1364713964"/>
-      </p:ext>
-    </p:extLst>
-  </p:cSld>
-  <p:clrMapOvr>
-    <a:masterClrMapping/>
-  </p:clrMapOvr>
-  <p:transition/>
-</p:sld>
-</file>
-
 <file path=ppt/slides/slide22.xml><?xml version="1.0" encoding="utf-8"?>
 <p:sld xmlns:a="http://schemas.openxmlformats.org/drawingml/2006/main" xmlns:r="http://schemas.openxmlformats.org/officeDocument/2006/relationships" xmlns:p="http://schemas.openxmlformats.org/presentationml/2006/main">
   <p:cSld>
@@ -9028,48 +9186,84 @@
           <a:lstStyle/>
           <a:p>
             <a:r>
+              <a:rPr lang="en-US" altLang="zh-TW" b="0" dirty="0" smtClean="0">
+                <a:ea typeface="標楷體" panose="03000509000000000000" pitchFamily="65" charset="-120"/>
+              </a:rPr>
+              <a:t>mm2s</a:t>
+            </a:r>
+            <a:r>
+              <a:rPr lang="zh-TW" altLang="en-US" b="0" dirty="0" smtClean="0">
+                <a:ea typeface="標楷體" panose="03000509000000000000" pitchFamily="65" charset="-120"/>
+              </a:rPr>
+              <a:t> </a:t>
+            </a:r>
+            <a:r>
+              <a:rPr lang="en-US" altLang="zh-TW" b="0" dirty="0" smtClean="0">
+                <a:ea typeface="標楷體" panose="03000509000000000000" pitchFamily="65" charset="-120"/>
+              </a:rPr>
+              <a:t>(</a:t>
+            </a:r>
+            <a:r>
               <a:rPr lang="en-US" altLang="zh-TW" b="0" dirty="0" err="1" smtClean="0">
                 <a:ea typeface="標楷體" panose="03000509000000000000" pitchFamily="65" charset="-120"/>
               </a:rPr>
-              <a:t>Ip_m</a:t>
-            </a:r>
+              <a:t>memRead</a:t>
+            </a:r>
+            <a:r>
+              <a:rPr lang="en-US" altLang="zh-TW" b="0" dirty="0" smtClean="0">
+                <a:ea typeface="標楷體" panose="03000509000000000000" pitchFamily="65" charset="-120"/>
+              </a:rPr>
+              <a:t>)</a:t>
+            </a:r>
+          </a:p>
+          <a:p>
+            <a:endParaRPr lang="en-US" altLang="zh-TW" b="0" dirty="0">
+              <a:ea typeface="標楷體" panose="03000509000000000000" pitchFamily="65" charset="-120"/>
+            </a:endParaRPr>
+          </a:p>
+          <a:p>
             <a:endParaRPr lang="en-US" altLang="zh-TW" b="0" dirty="0" smtClean="0">
               <a:ea typeface="標楷體" panose="03000509000000000000" pitchFamily="65" charset="-120"/>
             </a:endParaRPr>
           </a:p>
           <a:p>
-            <a:endParaRPr lang="en-US" altLang="zh-TW" b="0" dirty="0" smtClean="0">
-              <a:ea typeface="標楷體" panose="03000509000000000000" pitchFamily="65" charset="-120"/>
-            </a:endParaRPr>
-          </a:p>
-          <a:p>
             <a:endParaRPr lang="en-US" altLang="zh-TW" b="0" dirty="0">
               <a:ea typeface="標楷體" panose="03000509000000000000" pitchFamily="65" charset="-120"/>
             </a:endParaRPr>
           </a:p>
           <a:p>
-            <a:endParaRPr lang="en-US" altLang="zh-TW" b="0" dirty="0" smtClean="0">
+            <a:pPr marL="44450" indent="0">
+              <a:buNone/>
+            </a:pPr>
+            <a:endParaRPr lang="en-US" altLang="zh-TW" b="0" dirty="0">
               <a:ea typeface="標楷體" panose="03000509000000000000" pitchFamily="65" charset="-120"/>
             </a:endParaRPr>
           </a:p>
           <a:p>
-            <a:endParaRPr lang="en-US" altLang="zh-TW" b="0" dirty="0" smtClean="0">
-              <a:ea typeface="標楷體" panose="03000509000000000000" pitchFamily="65" charset="-120"/>
-            </a:endParaRPr>
-          </a:p>
-          <a:p>
-            <a:endParaRPr lang="en-US" altLang="zh-TW" b="0" dirty="0" smtClean="0">
-              <a:ea typeface="標楷體" panose="03000509000000000000" pitchFamily="65" charset="-120"/>
-            </a:endParaRPr>
-          </a:p>
-          <a:p>
+            <a:pPr>
+              <a:lnSpc>
+                <a:spcPct val="200000"/>
+              </a:lnSpc>
+            </a:pPr>
+            <a:r>
+              <a:rPr lang="en-US" altLang="zh-TW" b="0" dirty="0" smtClean="0">
+                <a:ea typeface="標楷體" panose="03000509000000000000" pitchFamily="65" charset="-120"/>
+              </a:rPr>
+              <a:t>S2mm (</a:t>
+            </a:r>
             <a:r>
               <a:rPr lang="en-US" altLang="zh-TW" b="0" dirty="0" err="1" smtClean="0">
                 <a:ea typeface="標楷體" panose="03000509000000000000" pitchFamily="65" charset="-120"/>
               </a:rPr>
-              <a:t>Ip_s</a:t>
-            </a:r>
-            <a:endParaRPr lang="en-US" altLang="zh-TW" b="0" dirty="0" smtClean="0">
+              <a:t>memWrite</a:t>
+            </a:r>
+            <a:r>
+              <a:rPr lang="en-US" altLang="zh-TW" b="0" dirty="0" smtClean="0">
+                <a:ea typeface="標楷體" panose="03000509000000000000" pitchFamily="65" charset="-120"/>
+              </a:rPr>
+              <a:t>)</a:t>
+            </a:r>
+            <a:endParaRPr lang="en-US" altLang="zh-TW" b="0" dirty="0">
               <a:ea typeface="標楷體" panose="03000509000000000000" pitchFamily="65" charset="-120"/>
             </a:endParaRPr>
           </a:p>
@@ -9107,7 +9301,7 @@
       </p:sp>
       <p:pic>
         <p:nvPicPr>
-          <p:cNvPr id="5" name="圖片 4"/>
+          <p:cNvPr id="13" name="圖片 12"/>
           <p:cNvPicPr>
             <a:picLocks noChangeAspect="1"/>
           </p:cNvPicPr>
@@ -9115,142 +9309,13 @@
         </p:nvPicPr>
         <p:blipFill rotWithShape="1">
           <a:blip r:embed="rId2"/>
-          <a:srcRect b="51741"/>
+          <a:srcRect b="6626"/>
           <a:stretch/>
         </p:blipFill>
         <p:spPr>
           <a:xfrm>
-            <a:off x="457200" y="2428648"/>
-            <a:ext cx="5436000" cy="1079237"/>
-          </a:xfrm>
-          <a:prstGeom prst="rect">
-            <a:avLst/>
-          </a:prstGeom>
-        </p:spPr>
-      </p:pic>
-      <p:pic>
-        <p:nvPicPr>
-          <p:cNvPr id="6" name="圖片 5"/>
-          <p:cNvPicPr>
-            <a:picLocks noChangeAspect="1"/>
-          </p:cNvPicPr>
-          <p:nvPr/>
-        </p:nvPicPr>
-        <p:blipFill rotWithShape="1">
-          <a:blip r:embed="rId3"/>
-          <a:srcRect b="52071"/>
-          <a:stretch/>
-        </p:blipFill>
-        <p:spPr>
-          <a:xfrm>
-            <a:off x="457200" y="3768006"/>
-            <a:ext cx="6139942" cy="1080000"/>
-          </a:xfrm>
-          <a:prstGeom prst="rect">
-            <a:avLst/>
-          </a:prstGeom>
-        </p:spPr>
-      </p:pic>
-      <p:pic>
-        <p:nvPicPr>
-          <p:cNvPr id="7" name="圖片 6"/>
-          <p:cNvPicPr>
-            <a:picLocks noChangeAspect="1"/>
-          </p:cNvPicPr>
-          <p:nvPr/>
-        </p:nvPicPr>
-        <p:blipFill>
-          <a:blip r:embed="rId4"/>
-          <a:stretch>
-            <a:fillRect/>
-          </a:stretch>
-        </p:blipFill>
-        <p:spPr>
-          <a:xfrm>
-            <a:off x="7624282" y="2428646"/>
-            <a:ext cx="5040000" cy="2425933"/>
-          </a:xfrm>
-          <a:prstGeom prst="rect">
-            <a:avLst/>
-          </a:prstGeom>
-        </p:spPr>
-      </p:pic>
-      <p:sp>
-        <p:nvSpPr>
-          <p:cNvPr id="9" name="矩形 8"/>
-          <p:cNvSpPr/>
-          <p:nvPr/>
-        </p:nvSpPr>
-        <p:spPr>
-          <a:xfrm>
-            <a:off x="480546" y="1966982"/>
-            <a:ext cx="1863011" cy="461665"/>
-          </a:xfrm>
-          <a:prstGeom prst="rect">
-            <a:avLst/>
-          </a:prstGeom>
-        </p:spPr>
-        <p:txBody>
-          <a:bodyPr wrap="none">
-            <a:spAutoFit/>
-          </a:bodyPr>
-          <a:lstStyle/>
-          <a:p>
-            <a:r>
-              <a:rPr lang="en-US" altLang="zh-TW" dirty="0">
-                <a:ea typeface="標楷體" panose="03000509000000000000" pitchFamily="65" charset="-120"/>
-              </a:rPr>
-              <a:t>Connectivity</a:t>
-            </a:r>
-            <a:endParaRPr lang="en-US" dirty="0"/>
-          </a:p>
-        </p:txBody>
-      </p:sp>
-      <p:sp>
-        <p:nvSpPr>
-          <p:cNvPr id="10" name="矩形 9"/>
-          <p:cNvSpPr/>
-          <p:nvPr/>
-        </p:nvSpPr>
-        <p:spPr>
-          <a:xfrm>
-            <a:off x="7565230" y="1966981"/>
-            <a:ext cx="2307042" cy="461665"/>
-          </a:xfrm>
-          <a:prstGeom prst="rect">
-            <a:avLst/>
-          </a:prstGeom>
-        </p:spPr>
-        <p:txBody>
-          <a:bodyPr wrap="none">
-            <a:spAutoFit/>
-          </a:bodyPr>
-          <a:lstStyle/>
-          <a:p>
-            <a:r>
-              <a:rPr lang="en-US" altLang="zh-TW" dirty="0"/>
-              <a:t>Network setting</a:t>
-            </a:r>
-          </a:p>
-        </p:txBody>
-      </p:sp>
-      <p:pic>
-        <p:nvPicPr>
-          <p:cNvPr id="11" name="圖片 10"/>
-          <p:cNvPicPr>
-            <a:picLocks noChangeAspect="1"/>
-          </p:cNvPicPr>
-          <p:nvPr/>
-        </p:nvPicPr>
-        <p:blipFill rotWithShape="1">
-          <a:blip r:embed="rId2"/>
-          <a:srcRect t="51518"/>
-          <a:stretch/>
-        </p:blipFill>
-        <p:spPr>
-          <a:xfrm>
-            <a:off x="457200" y="6170304"/>
-            <a:ext cx="5474106" cy="1091813"/>
+            <a:off x="3255514" y="1980559"/>
+            <a:ext cx="6430272" cy="2855311"/>
           </a:xfrm>
           <a:prstGeom prst="rect">
             <a:avLst/>
@@ -9265,108 +9330,26 @@
           </p:cNvPicPr>
           <p:nvPr/>
         </p:nvPicPr>
-        <p:blipFill rotWithShape="1">
+        <p:blipFill>
           <a:blip r:embed="rId3"/>
-          <a:srcRect t="51856"/>
-          <a:stretch/>
-        </p:blipFill>
-        <p:spPr>
-          <a:xfrm>
-            <a:off x="446582" y="7534921"/>
-            <a:ext cx="6140624" cy="1084965"/>
-          </a:xfrm>
-          <a:prstGeom prst="rect">
-            <a:avLst/>
-          </a:prstGeom>
-        </p:spPr>
-      </p:pic>
-      <p:sp>
-        <p:nvSpPr>
-          <p:cNvPr id="18" name="矩形 17"/>
-          <p:cNvSpPr/>
-          <p:nvPr/>
-        </p:nvSpPr>
-        <p:spPr>
-          <a:xfrm>
-            <a:off x="457200" y="5708639"/>
-            <a:ext cx="1863011" cy="461665"/>
-          </a:xfrm>
-          <a:prstGeom prst="rect">
-            <a:avLst/>
-          </a:prstGeom>
-        </p:spPr>
-        <p:txBody>
-          <a:bodyPr wrap="none">
-            <a:spAutoFit/>
-          </a:bodyPr>
-          <a:lstStyle/>
-          <a:p>
-            <a:r>
-              <a:rPr lang="en-US" altLang="zh-TW" dirty="0">
-                <a:ea typeface="標楷體" panose="03000509000000000000" pitchFamily="65" charset="-120"/>
-              </a:rPr>
-              <a:t>Connectivity</a:t>
-            </a:r>
-            <a:endParaRPr lang="en-US" dirty="0"/>
-          </a:p>
-        </p:txBody>
-      </p:sp>
-      <p:pic>
-        <p:nvPicPr>
-          <p:cNvPr id="19" name="圖片 18"/>
-          <p:cNvPicPr>
-            <a:picLocks noChangeAspect="1"/>
-          </p:cNvPicPr>
-          <p:nvPr/>
-        </p:nvPicPr>
-        <p:blipFill>
-          <a:blip r:embed="rId5"/>
           <a:stretch>
             <a:fillRect/>
           </a:stretch>
         </p:blipFill>
         <p:spPr>
           <a:xfrm>
-            <a:off x="7624282" y="6170304"/>
-            <a:ext cx="5040000" cy="843194"/>
+            <a:off x="2861760" y="5524872"/>
+            <a:ext cx="7192379" cy="3229426"/>
           </a:xfrm>
           <a:prstGeom prst="rect">
             <a:avLst/>
           </a:prstGeom>
         </p:spPr>
       </p:pic>
-      <p:sp>
-        <p:nvSpPr>
-          <p:cNvPr id="20" name="矩形 19"/>
-          <p:cNvSpPr/>
-          <p:nvPr/>
-        </p:nvSpPr>
-        <p:spPr>
-          <a:xfrm>
-            <a:off x="7609797" y="5708639"/>
-            <a:ext cx="2307042" cy="461665"/>
-          </a:xfrm>
-          <a:prstGeom prst="rect">
-            <a:avLst/>
-          </a:prstGeom>
-        </p:spPr>
-        <p:txBody>
-          <a:bodyPr wrap="none">
-            <a:spAutoFit/>
-          </a:bodyPr>
-          <a:lstStyle/>
-          <a:p>
-            <a:r>
-              <a:rPr lang="en-US" altLang="zh-TW" dirty="0"/>
-              <a:t>Network setting</a:t>
-            </a:r>
-          </a:p>
-        </p:txBody>
-      </p:sp>
     </p:spTree>
     <p:extLst>
       <p:ext uri="{BB962C8B-B14F-4D97-AF65-F5344CB8AC3E}">
-        <p14:creationId xmlns:p14="http://schemas.microsoft.com/office/powerpoint/2010/main" val="4260446955"/>
+        <p14:creationId xmlns:p14="http://schemas.microsoft.com/office/powerpoint/2010/main" val="1364713964"/>
       </p:ext>
     </p:extLst>
   </p:cSld>
@@ -9419,17 +9402,8 @@
               <a:rPr lang="en-US" altLang="zh-TW" dirty="0">
                 <a:ea typeface="標楷體" panose="03000509000000000000" pitchFamily="65" charset="-120"/>
               </a:rPr>
-              <a:t>Host </a:t>
-            </a:r>
-            <a:r>
-              <a:rPr lang="en-US" altLang="zh-TW" dirty="0" smtClean="0">
-                <a:ea typeface="標楷體" panose="03000509000000000000" pitchFamily="65" charset="-120"/>
-              </a:rPr>
-              <a:t>program</a:t>
-            </a:r>
-            <a:endParaRPr lang="en-US" altLang="zh-TW" dirty="0">
-              <a:ea typeface="標楷體" panose="03000509000000000000" pitchFamily="65" charset="-120"/>
-            </a:endParaRPr>
+              <a:t>Verification System </a:t>
+            </a:r>
           </a:p>
         </p:txBody>
       </p:sp>
@@ -9455,16 +9429,10 @@
           <a:lstStyle/>
           <a:p>
             <a:r>
-              <a:rPr lang="en-US" altLang="zh-TW" b="0" dirty="0" smtClean="0">
-                <a:ea typeface="標楷體" panose="03000509000000000000" pitchFamily="65" charset="-120"/>
-              </a:rPr>
-              <a:t>Set kernel &amp; </a:t>
-            </a:r>
-            <a:r>
               <a:rPr lang="en-US" altLang="zh-TW" b="0" dirty="0" err="1" smtClean="0">
                 <a:ea typeface="標楷體" panose="03000509000000000000" pitchFamily="65" charset="-120"/>
               </a:rPr>
-              <a:t>ip</a:t>
+              <a:t>Ip_m</a:t>
             </a:r>
             <a:endParaRPr lang="en-US" altLang="zh-TW" b="0" dirty="0" smtClean="0">
               <a:ea typeface="標楷體" panose="03000509000000000000" pitchFamily="65" charset="-120"/>
@@ -9476,83 +9444,33 @@
             </a:endParaRPr>
           </a:p>
           <a:p>
+            <a:endParaRPr lang="en-US" altLang="zh-TW" b="0" dirty="0">
+              <a:ea typeface="標楷體" panose="03000509000000000000" pitchFamily="65" charset="-120"/>
+            </a:endParaRPr>
+          </a:p>
+          <a:p>
             <a:endParaRPr lang="en-US" altLang="zh-TW" b="0" dirty="0" smtClean="0">
               <a:ea typeface="標楷體" panose="03000509000000000000" pitchFamily="65" charset="-120"/>
             </a:endParaRPr>
           </a:p>
           <a:p>
-            <a:endParaRPr lang="en-US" altLang="zh-TW" b="0" dirty="0">
-              <a:ea typeface="標楷體" panose="03000509000000000000" pitchFamily="65" charset="-120"/>
-            </a:endParaRPr>
-          </a:p>
-          <a:p>
             <a:endParaRPr lang="en-US" altLang="zh-TW" b="0" dirty="0" smtClean="0">
               <a:ea typeface="標楷體" panose="03000509000000000000" pitchFamily="65" charset="-120"/>
             </a:endParaRPr>
           </a:p>
           <a:p>
-            <a:r>
-              <a:rPr lang="en-US" altLang="zh-TW" b="0" dirty="0" smtClean="0">
-                <a:ea typeface="標楷體" panose="03000509000000000000" pitchFamily="65" charset="-120"/>
-              </a:rPr>
-              <a:t>Set Feed Handler symbols</a:t>
-            </a:r>
-          </a:p>
-          <a:p>
-            <a:endParaRPr lang="en-US" altLang="zh-TW" b="0" dirty="0">
-              <a:ea typeface="標楷體" panose="03000509000000000000" pitchFamily="65" charset="-120"/>
-            </a:endParaRPr>
-          </a:p>
-          <a:p>
             <a:endParaRPr lang="en-US" altLang="zh-TW" b="0" dirty="0" smtClean="0">
               <a:ea typeface="標楷體" panose="03000509000000000000" pitchFamily="65" charset="-120"/>
             </a:endParaRPr>
           </a:p>
           <a:p>
             <a:r>
-              <a:rPr lang="en-US" altLang="zh-TW" b="0" dirty="0" smtClean="0">
-                <a:ea typeface="標楷體" panose="03000509000000000000" pitchFamily="65" charset="-120"/>
-              </a:rPr>
-              <a:t>Input</a:t>
-            </a:r>
-            <a:r>
-              <a:rPr lang="zh-TW" altLang="en-US" b="0" dirty="0" smtClean="0">
-                <a:ea typeface="標楷體" panose="03000509000000000000" pitchFamily="65" charset="-120"/>
-              </a:rPr>
-              <a:t> </a:t>
-            </a:r>
-            <a:r>
-              <a:rPr lang="en-US" altLang="zh-TW" b="0" dirty="0" smtClean="0">
-                <a:ea typeface="標楷體" panose="03000509000000000000" pitchFamily="65" charset="-120"/>
-              </a:rPr>
-              <a:t>/</a:t>
-            </a:r>
-            <a:r>
-              <a:rPr lang="zh-TW" altLang="en-US" b="0" smtClean="0">
-                <a:ea typeface="標楷體" panose="03000509000000000000" pitchFamily="65" charset="-120"/>
-              </a:rPr>
-              <a:t> </a:t>
-            </a:r>
-            <a:r>
-              <a:rPr lang="en-US" altLang="zh-TW" b="0" smtClean="0">
-                <a:ea typeface="標楷體" panose="03000509000000000000" pitchFamily="65" charset="-120"/>
-              </a:rPr>
-              <a:t>Output </a:t>
-            </a:r>
-            <a:r>
-              <a:rPr lang="en-US" altLang="zh-TW" b="0" dirty="0">
-                <a:ea typeface="標楷體" panose="03000509000000000000" pitchFamily="65" charset="-120"/>
-              </a:rPr>
-              <a:t>map</a:t>
-            </a:r>
-          </a:p>
-          <a:p>
+              <a:rPr lang="en-US" altLang="zh-TW" b="0" dirty="0" err="1" smtClean="0">
+                <a:ea typeface="標楷體" panose="03000509000000000000" pitchFamily="65" charset="-120"/>
+              </a:rPr>
+              <a:t>Ip_s</a:t>
+            </a:r>
             <a:endParaRPr lang="en-US" altLang="zh-TW" b="0" dirty="0" smtClean="0">
-              <a:ea typeface="標楷體" panose="03000509000000000000" pitchFamily="65" charset="-120"/>
-            </a:endParaRPr>
-          </a:p>
-          <a:p>
-            <a:endParaRPr lang="en-US" altLang="zh-TW" b="0" dirty="0">
               <a:ea typeface="標楷體" panose="03000509000000000000" pitchFamily="65" charset="-120"/>
             </a:endParaRPr>
           </a:p>
@@ -9596,16 +9514,15 @@
           </p:cNvPicPr>
           <p:nvPr/>
         </p:nvPicPr>
-        <p:blipFill>
+        <p:blipFill rotWithShape="1">
           <a:blip r:embed="rId2"/>
-          <a:stretch>
-            <a:fillRect/>
-          </a:stretch>
+          <a:srcRect b="51741"/>
+          <a:stretch/>
         </p:blipFill>
         <p:spPr>
           <a:xfrm>
-            <a:off x="3044042" y="2068647"/>
-            <a:ext cx="6853215" cy="2233316"/>
+            <a:off x="457200" y="2428648"/>
+            <a:ext cx="5436000" cy="1079237"/>
           </a:xfrm>
           <a:prstGeom prst="rect">
             <a:avLst/>
@@ -9620,16 +9537,15 @@
           </p:cNvPicPr>
           <p:nvPr/>
         </p:nvPicPr>
-        <p:blipFill>
+        <p:blipFill rotWithShape="1">
           <a:blip r:embed="rId3"/>
-          <a:stretch>
-            <a:fillRect/>
-          </a:stretch>
+          <a:srcRect b="52071"/>
+          <a:stretch/>
         </p:blipFill>
         <p:spPr>
           <a:xfrm>
-            <a:off x="708738" y="5344852"/>
-            <a:ext cx="11955543" cy="676369"/>
+            <a:off x="457200" y="3768006"/>
+            <a:ext cx="6139942" cy="1080000"/>
           </a:xfrm>
           <a:prstGeom prst="rect">
             <a:avLst/>
@@ -9638,7 +9554,7 @@
       </p:pic>
       <p:pic>
         <p:nvPicPr>
-          <p:cNvPr id="9" name="圖片 8"/>
+          <p:cNvPr id="7" name="圖片 6"/>
           <p:cNvPicPr>
             <a:picLocks noChangeAspect="1"/>
           </p:cNvPicPr>
@@ -9652,18 +9568,206 @@
         </p:blipFill>
         <p:spPr>
           <a:xfrm>
-            <a:off x="2785550" y="7107980"/>
-            <a:ext cx="7344800" cy="1276528"/>
+            <a:off x="7624282" y="2428646"/>
+            <a:ext cx="5040000" cy="2425933"/>
           </a:xfrm>
           <a:prstGeom prst="rect">
             <a:avLst/>
           </a:prstGeom>
         </p:spPr>
       </p:pic>
+      <p:sp>
+        <p:nvSpPr>
+          <p:cNvPr id="9" name="矩形 8"/>
+          <p:cNvSpPr/>
+          <p:nvPr/>
+        </p:nvSpPr>
+        <p:spPr>
+          <a:xfrm>
+            <a:off x="480546" y="1966982"/>
+            <a:ext cx="1863011" cy="461665"/>
+          </a:xfrm>
+          <a:prstGeom prst="rect">
+            <a:avLst/>
+          </a:prstGeom>
+        </p:spPr>
+        <p:txBody>
+          <a:bodyPr wrap="none">
+            <a:spAutoFit/>
+          </a:bodyPr>
+          <a:lstStyle/>
+          <a:p>
+            <a:r>
+              <a:rPr lang="en-US" altLang="zh-TW" dirty="0">
+                <a:ea typeface="標楷體" panose="03000509000000000000" pitchFamily="65" charset="-120"/>
+              </a:rPr>
+              <a:t>Connectivity</a:t>
+            </a:r>
+            <a:endParaRPr lang="en-US" dirty="0"/>
+          </a:p>
+        </p:txBody>
+      </p:sp>
+      <p:sp>
+        <p:nvSpPr>
+          <p:cNvPr id="10" name="矩形 9"/>
+          <p:cNvSpPr/>
+          <p:nvPr/>
+        </p:nvSpPr>
+        <p:spPr>
+          <a:xfrm>
+            <a:off x="7565230" y="1966981"/>
+            <a:ext cx="2307042" cy="461665"/>
+          </a:xfrm>
+          <a:prstGeom prst="rect">
+            <a:avLst/>
+          </a:prstGeom>
+        </p:spPr>
+        <p:txBody>
+          <a:bodyPr wrap="none">
+            <a:spAutoFit/>
+          </a:bodyPr>
+          <a:lstStyle/>
+          <a:p>
+            <a:r>
+              <a:rPr lang="en-US" altLang="zh-TW" dirty="0"/>
+              <a:t>Network setting</a:t>
+            </a:r>
+          </a:p>
+        </p:txBody>
+      </p:sp>
+      <p:pic>
+        <p:nvPicPr>
+          <p:cNvPr id="11" name="圖片 10"/>
+          <p:cNvPicPr>
+            <a:picLocks noChangeAspect="1"/>
+          </p:cNvPicPr>
+          <p:nvPr/>
+        </p:nvPicPr>
+        <p:blipFill rotWithShape="1">
+          <a:blip r:embed="rId2"/>
+          <a:srcRect t="51518"/>
+          <a:stretch/>
+        </p:blipFill>
+        <p:spPr>
+          <a:xfrm>
+            <a:off x="457200" y="6170304"/>
+            <a:ext cx="5474106" cy="1091813"/>
+          </a:xfrm>
+          <a:prstGeom prst="rect">
+            <a:avLst/>
+          </a:prstGeom>
+        </p:spPr>
+      </p:pic>
+      <p:pic>
+        <p:nvPicPr>
+          <p:cNvPr id="14" name="圖片 13"/>
+          <p:cNvPicPr>
+            <a:picLocks noChangeAspect="1"/>
+          </p:cNvPicPr>
+          <p:nvPr/>
+        </p:nvPicPr>
+        <p:blipFill rotWithShape="1">
+          <a:blip r:embed="rId3"/>
+          <a:srcRect t="51856"/>
+          <a:stretch/>
+        </p:blipFill>
+        <p:spPr>
+          <a:xfrm>
+            <a:off x="446582" y="7534921"/>
+            <a:ext cx="6140624" cy="1084965"/>
+          </a:xfrm>
+          <a:prstGeom prst="rect">
+            <a:avLst/>
+          </a:prstGeom>
+        </p:spPr>
+      </p:pic>
+      <p:sp>
+        <p:nvSpPr>
+          <p:cNvPr id="18" name="矩形 17"/>
+          <p:cNvSpPr/>
+          <p:nvPr/>
+        </p:nvSpPr>
+        <p:spPr>
+          <a:xfrm>
+            <a:off x="457200" y="5708639"/>
+            <a:ext cx="1863011" cy="461665"/>
+          </a:xfrm>
+          <a:prstGeom prst="rect">
+            <a:avLst/>
+          </a:prstGeom>
+        </p:spPr>
+        <p:txBody>
+          <a:bodyPr wrap="none">
+            <a:spAutoFit/>
+          </a:bodyPr>
+          <a:lstStyle/>
+          <a:p>
+            <a:r>
+              <a:rPr lang="en-US" altLang="zh-TW" dirty="0">
+                <a:ea typeface="標楷體" panose="03000509000000000000" pitchFamily="65" charset="-120"/>
+              </a:rPr>
+              <a:t>Connectivity</a:t>
+            </a:r>
+            <a:endParaRPr lang="en-US" dirty="0"/>
+          </a:p>
+        </p:txBody>
+      </p:sp>
+      <p:pic>
+        <p:nvPicPr>
+          <p:cNvPr id="19" name="圖片 18"/>
+          <p:cNvPicPr>
+            <a:picLocks noChangeAspect="1"/>
+          </p:cNvPicPr>
+          <p:nvPr/>
+        </p:nvPicPr>
+        <p:blipFill>
+          <a:blip r:embed="rId5"/>
+          <a:stretch>
+            <a:fillRect/>
+          </a:stretch>
+        </p:blipFill>
+        <p:spPr>
+          <a:xfrm>
+            <a:off x="7624282" y="6170304"/>
+            <a:ext cx="5040000" cy="843194"/>
+          </a:xfrm>
+          <a:prstGeom prst="rect">
+            <a:avLst/>
+          </a:prstGeom>
+        </p:spPr>
+      </p:pic>
+      <p:sp>
+        <p:nvSpPr>
+          <p:cNvPr id="20" name="矩形 19"/>
+          <p:cNvSpPr/>
+          <p:nvPr/>
+        </p:nvSpPr>
+        <p:spPr>
+          <a:xfrm>
+            <a:off x="7609797" y="5708639"/>
+            <a:ext cx="2307042" cy="461665"/>
+          </a:xfrm>
+          <a:prstGeom prst="rect">
+            <a:avLst/>
+          </a:prstGeom>
+        </p:spPr>
+        <p:txBody>
+          <a:bodyPr wrap="none">
+            <a:spAutoFit/>
+          </a:bodyPr>
+          <a:lstStyle/>
+          <a:p>
+            <a:r>
+              <a:rPr lang="en-US" altLang="zh-TW" dirty="0"/>
+              <a:t>Network setting</a:t>
+            </a:r>
+          </a:p>
+        </p:txBody>
+      </p:sp>
     </p:spTree>
     <p:extLst>
       <p:ext uri="{BB962C8B-B14F-4D97-AF65-F5344CB8AC3E}">
-        <p14:creationId xmlns:p14="http://schemas.microsoft.com/office/powerpoint/2010/main" val="1163338347"/>
+        <p14:creationId xmlns:p14="http://schemas.microsoft.com/office/powerpoint/2010/main" val="4260446955"/>
       </p:ext>
     </p:extLst>
   </p:cSld>
@@ -9752,24 +9856,30 @@
           <a:lstStyle/>
           <a:p>
             <a:r>
-              <a:rPr lang="en-US" b="0" dirty="0"/>
-              <a:t>D</a:t>
-            </a:r>
-            <a:r>
-              <a:rPr lang="en-US" b="0" dirty="0" smtClean="0"/>
-              <a:t>eclare </a:t>
-            </a:r>
-            <a:r>
-              <a:rPr lang="en-US" b="0" dirty="0"/>
-              <a:t>kernel </a:t>
-            </a:r>
-            <a:r>
-              <a:rPr lang="en-US" b="0" dirty="0" smtClean="0"/>
-              <a:t>run</a:t>
-            </a:r>
-          </a:p>
-          <a:p>
-            <a:endParaRPr lang="en-US" b="0" dirty="0"/>
+              <a:rPr lang="en-US" altLang="zh-TW" b="0" dirty="0" smtClean="0">
+                <a:ea typeface="標楷體" panose="03000509000000000000" pitchFamily="65" charset="-120"/>
+              </a:rPr>
+              <a:t>Set kernel &amp; </a:t>
+            </a:r>
+            <a:r>
+              <a:rPr lang="en-US" altLang="zh-TW" b="0" dirty="0" err="1" smtClean="0">
+                <a:ea typeface="標楷體" panose="03000509000000000000" pitchFamily="65" charset="-120"/>
+              </a:rPr>
+              <a:t>ip</a:t>
+            </a:r>
+            <a:endParaRPr lang="en-US" altLang="zh-TW" b="0" dirty="0" smtClean="0">
+              <a:ea typeface="標楷體" panose="03000509000000000000" pitchFamily="65" charset="-120"/>
+            </a:endParaRPr>
+          </a:p>
+          <a:p>
+            <a:endParaRPr lang="en-US" altLang="zh-TW" b="0" dirty="0" smtClean="0">
+              <a:ea typeface="標楷體" panose="03000509000000000000" pitchFamily="65" charset="-120"/>
+            </a:endParaRPr>
+          </a:p>
+          <a:p>
+            <a:endParaRPr lang="en-US" altLang="zh-TW" b="0" dirty="0" smtClean="0">
+              <a:ea typeface="標楷體" panose="03000509000000000000" pitchFamily="65" charset="-120"/>
+            </a:endParaRPr>
           </a:p>
           <a:p>
             <a:endParaRPr lang="en-US" altLang="zh-TW" b="0" dirty="0">
@@ -9782,26 +9892,55 @@
             </a:endParaRPr>
           </a:p>
           <a:p>
+            <a:r>
+              <a:rPr lang="en-US" altLang="zh-TW" b="0" dirty="0" smtClean="0">
+                <a:ea typeface="標楷體" panose="03000509000000000000" pitchFamily="65" charset="-120"/>
+              </a:rPr>
+              <a:t>Set Feed Handler symbols</a:t>
+            </a:r>
+          </a:p>
+          <a:p>
+            <a:endParaRPr lang="en-US" altLang="zh-TW" b="0" dirty="0">
+              <a:ea typeface="標楷體" panose="03000509000000000000" pitchFamily="65" charset="-120"/>
+            </a:endParaRPr>
+          </a:p>
+          <a:p>
             <a:endParaRPr lang="en-US" altLang="zh-TW" b="0" dirty="0" smtClean="0">
               <a:ea typeface="標楷體" panose="03000509000000000000" pitchFamily="65" charset="-120"/>
             </a:endParaRPr>
           </a:p>
           <a:p>
             <a:r>
-              <a:rPr lang="en-US" altLang="zh-TW" b="0" dirty="0">
-                <a:ea typeface="標楷體" panose="03000509000000000000" pitchFamily="65" charset="-120"/>
-              </a:rPr>
-              <a:t>D</a:t>
-            </a:r>
-            <a:r>
               <a:rPr lang="en-US" altLang="zh-TW" b="0" dirty="0" smtClean="0">
                 <a:ea typeface="標楷體" panose="03000509000000000000" pitchFamily="65" charset="-120"/>
               </a:rPr>
-              <a:t>ata transfer</a:t>
-            </a:r>
-          </a:p>
-          <a:p>
-            <a:endParaRPr lang="en-US" altLang="zh-TW" b="0" dirty="0" smtClean="0">
+              <a:t>Input</a:t>
+            </a:r>
+            <a:r>
+              <a:rPr lang="zh-TW" altLang="en-US" b="0" dirty="0" smtClean="0">
+                <a:ea typeface="標楷體" panose="03000509000000000000" pitchFamily="65" charset="-120"/>
+              </a:rPr>
+              <a:t> </a:t>
+            </a:r>
+            <a:r>
+              <a:rPr lang="en-US" altLang="zh-TW" b="0" dirty="0" smtClean="0">
+                <a:ea typeface="標楷體" panose="03000509000000000000" pitchFamily="65" charset="-120"/>
+              </a:rPr>
+              <a:t>/</a:t>
+            </a:r>
+            <a:r>
+              <a:rPr lang="zh-TW" altLang="en-US" b="0" dirty="0" smtClean="0">
+                <a:ea typeface="標楷體" panose="03000509000000000000" pitchFamily="65" charset="-120"/>
+              </a:rPr>
+              <a:t> </a:t>
+            </a:r>
+            <a:r>
+              <a:rPr lang="en-US" altLang="zh-TW" b="0" dirty="0" smtClean="0">
+                <a:ea typeface="標楷體" panose="03000509000000000000" pitchFamily="65" charset="-120"/>
+              </a:rPr>
+              <a:t>Output map</a:t>
+            </a:r>
+            <a:endParaRPr lang="en-US" altLang="zh-TW" b="0" dirty="0">
               <a:ea typeface="標楷體" panose="03000509000000000000" pitchFamily="65" charset="-120"/>
             </a:endParaRPr>
           </a:p>
@@ -9839,7 +9978,7 @@
       </p:sp>
       <p:pic>
         <p:nvPicPr>
-          <p:cNvPr id="8" name="圖片 7"/>
+          <p:cNvPr id="5" name="圖片 4"/>
           <p:cNvPicPr>
             <a:picLocks noChangeAspect="1"/>
           </p:cNvPicPr>
@@ -9853,8 +9992,8 @@
         </p:blipFill>
         <p:spPr>
           <a:xfrm>
-            <a:off x="2074249" y="5128533"/>
-            <a:ext cx="8792802" cy="3648584"/>
+            <a:off x="3044042" y="2068647"/>
+            <a:ext cx="6853215" cy="2233316"/>
           </a:xfrm>
           <a:prstGeom prst="rect">
             <a:avLst/>
@@ -9863,7 +10002,7 @@
       </p:pic>
       <p:pic>
         <p:nvPicPr>
-          <p:cNvPr id="10" name="圖片 9"/>
+          <p:cNvPr id="6" name="圖片 5"/>
           <p:cNvPicPr>
             <a:picLocks noChangeAspect="1"/>
           </p:cNvPicPr>
@@ -9877,8 +10016,32 @@
         </p:blipFill>
         <p:spPr>
           <a:xfrm>
-            <a:off x="4717804" y="1996480"/>
-            <a:ext cx="3480292" cy="1847145"/>
+            <a:off x="706357" y="5248686"/>
+            <a:ext cx="11955543" cy="676369"/>
+          </a:xfrm>
+          <a:prstGeom prst="rect">
+            <a:avLst/>
+          </a:prstGeom>
+        </p:spPr>
+      </p:pic>
+      <p:pic>
+        <p:nvPicPr>
+          <p:cNvPr id="9" name="圖片 8"/>
+          <p:cNvPicPr>
+            <a:picLocks noChangeAspect="1"/>
+          </p:cNvPicPr>
+          <p:nvPr/>
+        </p:nvPicPr>
+        <p:blipFill>
+          <a:blip r:embed="rId4"/>
+          <a:stretch>
+            <a:fillRect/>
+          </a:stretch>
+        </p:blipFill>
+        <p:spPr>
+          <a:xfrm>
+            <a:off x="2785550" y="7107980"/>
+            <a:ext cx="7344800" cy="1276528"/>
           </a:xfrm>
           <a:prstGeom prst="rect">
             <a:avLst/>
@@ -9888,7 +10051,7 @@
     </p:spTree>
     <p:extLst>
       <p:ext uri="{BB962C8B-B14F-4D97-AF65-F5344CB8AC3E}">
-        <p14:creationId xmlns:p14="http://schemas.microsoft.com/office/powerpoint/2010/main" val="56978936"/>
+        <p14:creationId xmlns:p14="http://schemas.microsoft.com/office/powerpoint/2010/main" val="1163338347"/>
       </p:ext>
     </p:extLst>
   </p:cSld>
@@ -9941,8 +10104,17 @@
               <a:rPr lang="en-US" altLang="zh-TW" dirty="0">
                 <a:ea typeface="標楷體" panose="03000509000000000000" pitchFamily="65" charset="-120"/>
               </a:rPr>
-              <a:t>Lab</a:t>
-            </a:r>
+              <a:t>Host </a:t>
+            </a:r>
+            <a:r>
+              <a:rPr lang="en-US" altLang="zh-TW" dirty="0" smtClean="0">
+                <a:ea typeface="標楷體" panose="03000509000000000000" pitchFamily="65" charset="-120"/>
+              </a:rPr>
+              <a:t>program</a:t>
+            </a:r>
+            <a:endParaRPr lang="en-US" altLang="zh-TW" dirty="0">
+              <a:ea typeface="標楷體" panose="03000509000000000000" pitchFamily="65" charset="-120"/>
+            </a:endParaRPr>
           </a:p>
         </p:txBody>
       </p:sp>
@@ -9968,129 +10140,53 @@
           <a:lstStyle/>
           <a:p>
             <a:r>
-              <a:rPr lang="en-US" altLang="zh-TW" b="0" dirty="0" smtClean="0">
-                <a:ea typeface="標楷體" panose="03000509000000000000" pitchFamily="65" charset="-120"/>
-              </a:rPr>
-              <a:t>Build</a:t>
-            </a:r>
-            <a:r>
-              <a:rPr lang="zh-TW" altLang="en-US" b="0" dirty="0" smtClean="0">
-                <a:ea typeface="標楷體" panose="03000509000000000000" pitchFamily="65" charset="-120"/>
-              </a:rPr>
-              <a:t> </a:t>
-            </a:r>
-            <a:r>
-              <a:rPr lang="en-US" altLang="zh-TW" b="0" dirty="0" smtClean="0">
-                <a:ea typeface="標楷體" panose="03000509000000000000" pitchFamily="65" charset="-120"/>
-              </a:rPr>
-              <a:t>&amp;</a:t>
-            </a:r>
-            <a:r>
-              <a:rPr lang="zh-TW" altLang="en-US" b="0" dirty="0" smtClean="0">
-                <a:ea typeface="標楷體" panose="03000509000000000000" pitchFamily="65" charset="-120"/>
-              </a:rPr>
-              <a:t> </a:t>
-            </a:r>
-            <a:r>
-              <a:rPr lang="en-US" altLang="zh-TW" b="0" dirty="0" smtClean="0">
-                <a:ea typeface="標楷體" panose="03000509000000000000" pitchFamily="65" charset="-120"/>
-              </a:rPr>
-              <a:t>Run</a:t>
-            </a:r>
-          </a:p>
-          <a:p>
-            <a:pPr lvl="1"/>
-            <a:r>
-              <a:rPr lang="en-US" altLang="zh-TW" dirty="0" smtClean="0">
-                <a:ea typeface="標楷體" panose="03000509000000000000" pitchFamily="65" charset="-120"/>
-              </a:rPr>
-              <a:t>./run.sh &gt;&gt; output.log</a:t>
-            </a:r>
+              <a:rPr lang="en-US" b="0" dirty="0"/>
+              <a:t>D</a:t>
+            </a:r>
+            <a:r>
+              <a:rPr lang="en-US" b="0" dirty="0" smtClean="0"/>
+              <a:t>eclare </a:t>
+            </a:r>
+            <a:r>
+              <a:rPr lang="en-US" b="0" dirty="0"/>
+              <a:t>kernel </a:t>
+            </a:r>
+            <a:r>
+              <a:rPr lang="en-US" b="0" dirty="0" smtClean="0"/>
+              <a:t>run</a:t>
+            </a:r>
+          </a:p>
+          <a:p>
+            <a:endParaRPr lang="en-US" b="0" dirty="0"/>
+          </a:p>
+          <a:p>
+            <a:endParaRPr lang="en-US" altLang="zh-TW" b="0" dirty="0">
+              <a:ea typeface="標楷體" panose="03000509000000000000" pitchFamily="65" charset="-120"/>
+            </a:endParaRPr>
+          </a:p>
+          <a:p>
             <a:endParaRPr lang="en-US" altLang="zh-TW" b="0" dirty="0" smtClean="0">
               <a:ea typeface="標楷體" panose="03000509000000000000" pitchFamily="65" charset="-120"/>
             </a:endParaRPr>
           </a:p>
           <a:p>
-            <a:r>
-              <a:rPr lang="en-US" altLang="zh-TW" b="0" dirty="0" smtClean="0">
-                <a:ea typeface="標楷體" panose="03000509000000000000" pitchFamily="65" charset="-120"/>
-              </a:rPr>
-              <a:t>Report</a:t>
-            </a:r>
-          </a:p>
-          <a:p>
-            <a:pPr lvl="1"/>
-            <a:r>
-              <a:rPr lang="en-US" altLang="zh-TW" dirty="0" err="1">
-                <a:ea typeface="標楷體" panose="03000509000000000000" pitchFamily="65" charset="-120"/>
-              </a:rPr>
-              <a:t>pricingStrategyPeg</a:t>
-            </a:r>
             <a:endParaRPr lang="en-US" altLang="zh-TW" b="0" dirty="0" smtClean="0">
               <a:ea typeface="標楷體" panose="03000509000000000000" pitchFamily="65" charset="-120"/>
             </a:endParaRPr>
           </a:p>
           <a:p>
-            <a:pPr lvl="1"/>
-            <a:r>
-              <a:rPr lang="en-US" altLang="zh-TW" dirty="0">
-                <a:ea typeface="標楷體" panose="03000509000000000000" pitchFamily="65" charset="-120"/>
-              </a:rPr>
-              <a:t>Result </a:t>
-            </a:r>
-            <a:r>
-              <a:rPr lang="en-US" altLang="zh-TW" dirty="0" smtClean="0">
-                <a:ea typeface="標楷體" panose="03000509000000000000" pitchFamily="65" charset="-120"/>
-              </a:rPr>
-              <a:t>analyzation</a:t>
-            </a:r>
-          </a:p>
-          <a:p>
-            <a:pPr lvl="1"/>
-            <a:r>
-              <a:rPr lang="en-US" altLang="zh-TW" dirty="0">
-                <a:ea typeface="標楷體" panose="03000509000000000000" pitchFamily="65" charset="-120"/>
-              </a:rPr>
-              <a:t>The packet number when the </a:t>
-            </a:r>
-            <a:r>
-              <a:rPr lang="en-US" altLang="zh-TW" dirty="0" smtClean="0">
-                <a:ea typeface="標楷體" panose="03000509000000000000" pitchFamily="65" charset="-120"/>
-              </a:rPr>
-              <a:t>strategy </a:t>
-            </a:r>
-            <a:r>
-              <a:rPr lang="en-US" altLang="zh-TW" dirty="0">
-                <a:ea typeface="標楷體" panose="03000509000000000000" pitchFamily="65" charset="-120"/>
-              </a:rPr>
-              <a:t>is </a:t>
-            </a:r>
-            <a:r>
-              <a:rPr lang="en-US" altLang="zh-TW" dirty="0" smtClean="0">
-                <a:ea typeface="標楷體" panose="03000509000000000000" pitchFamily="65" charset="-120"/>
-              </a:rPr>
-              <a:t>triggered</a:t>
-            </a:r>
-          </a:p>
-          <a:p>
-            <a:pPr lvl="1"/>
-            <a:r>
-              <a:rPr lang="en-US" altLang="zh-TW" dirty="0">
-                <a:ea typeface="標楷體" panose="03000509000000000000" pitchFamily="65" charset="-120"/>
-              </a:rPr>
-              <a:t>Whether the output packet matches to the operation of the pricing </a:t>
-            </a:r>
-            <a:r>
-              <a:rPr lang="en-US" altLang="zh-TW" dirty="0" smtClean="0">
-                <a:ea typeface="標楷體" panose="03000509000000000000" pitchFamily="65" charset="-120"/>
-              </a:rPr>
-              <a:t>Engine</a:t>
-            </a:r>
-          </a:p>
-          <a:p>
-            <a:endParaRPr lang="en-US" altLang="zh-TW" dirty="0" smtClean="0">
-              <a:ea typeface="標楷體" panose="03000509000000000000" pitchFamily="65" charset="-120"/>
-            </a:endParaRPr>
+            <a:r>
+              <a:rPr lang="en-US" altLang="zh-TW" b="0" dirty="0">
+                <a:ea typeface="標楷體" panose="03000509000000000000" pitchFamily="65" charset="-120"/>
+              </a:rPr>
+              <a:t>D</a:t>
+            </a:r>
+            <a:r>
+              <a:rPr lang="en-US" altLang="zh-TW" b="0" dirty="0" smtClean="0">
+                <a:ea typeface="標楷體" panose="03000509000000000000" pitchFamily="65" charset="-120"/>
+              </a:rPr>
+              <a:t>ata transfer</a:t>
+            </a:r>
           </a:p>
         </p:txBody>
       </p:sp>
@@ -10126,7 +10222,7 @@
       </p:sp>
       <p:pic>
         <p:nvPicPr>
-          <p:cNvPr id="5" name="圖片 4"/>
+          <p:cNvPr id="8" name="圖片 7"/>
           <p:cNvPicPr>
             <a:picLocks noChangeAspect="1"/>
           </p:cNvPicPr>
@@ -10140,8 +10236,8 @@
         </p:blipFill>
         <p:spPr>
           <a:xfrm>
-            <a:off x="237704" y="5367306"/>
-            <a:ext cx="10008000" cy="673684"/>
+            <a:off x="2074249" y="5128533"/>
+            <a:ext cx="8792802" cy="3648584"/>
           </a:xfrm>
           <a:prstGeom prst="rect">
             <a:avLst/>
@@ -10150,21 +10246,22 @@
       </p:pic>
       <p:pic>
         <p:nvPicPr>
-          <p:cNvPr id="6" name="圖片 5"/>
+          <p:cNvPr id="10" name="圖片 9"/>
           <p:cNvPicPr>
             <a:picLocks noChangeAspect="1"/>
           </p:cNvPicPr>
           <p:nvPr/>
         </p:nvPicPr>
-        <p:blipFill rotWithShape="1">
+        <p:blipFill>
           <a:blip r:embed="rId3"/>
-          <a:srcRect b="35784"/>
-          <a:stretch/>
+          <a:stretch>
+            <a:fillRect/>
+          </a:stretch>
         </p:blipFill>
         <p:spPr>
           <a:xfrm>
-            <a:off x="10534848" y="5345336"/>
-            <a:ext cx="1986108" cy="4356000"/>
+            <a:off x="4503382" y="1996480"/>
+            <a:ext cx="3934535" cy="2088232"/>
           </a:xfrm>
           <a:prstGeom prst="rect">
             <a:avLst/>
@@ -10174,7 +10271,7 @@
     </p:spTree>
     <p:extLst>
       <p:ext uri="{BB962C8B-B14F-4D97-AF65-F5344CB8AC3E}">
-        <p14:creationId xmlns:p14="http://schemas.microsoft.com/office/powerpoint/2010/main" val="3818463783"/>
+        <p14:creationId xmlns:p14="http://schemas.microsoft.com/office/powerpoint/2010/main" val="56978936"/>
       </p:ext>
     </p:extLst>
   </p:cSld>
@@ -10224,11 +10321,14 @@
           <a:lstStyle/>
           <a:p>
             <a:r>
-              <a:rPr lang="en-US" altLang="zh-TW" dirty="0">
+              <a:rPr lang="en-US" altLang="zh-TW" dirty="0" smtClean="0">
                 <a:ea typeface="標楷體" panose="03000509000000000000" pitchFamily="65" charset="-120"/>
               </a:rPr>
               <a:t>Lab</a:t>
             </a:r>
+            <a:endParaRPr lang="en-US" altLang="zh-TW" dirty="0">
+              <a:ea typeface="標楷體" panose="03000509000000000000" pitchFamily="65" charset="-120"/>
+            </a:endParaRPr>
           </a:p>
         </p:txBody>
       </p:sp>
@@ -10248,117 +10348,102 @@
             <p:ph idx="1"/>
           </p:nvPr>
         </p:nvSpPr>
-        <p:spPr>
-          <a:xfrm>
-            <a:off x="457200" y="1348408"/>
-            <a:ext cx="12022138" cy="7992888"/>
-          </a:xfrm>
-        </p:spPr>
+        <p:spPr/>
         <p:txBody>
           <a:bodyPr/>
           <a:lstStyle/>
           <a:p>
             <a:r>
+              <a:rPr lang="en-US" altLang="zh-TW" b="0" dirty="0">
+                <a:ea typeface="標楷體" panose="03000509000000000000" pitchFamily="65" charset="-120"/>
+              </a:rPr>
+              <a:t>Pricing</a:t>
+            </a:r>
+            <a:r>
+              <a:rPr lang="zh-TW" altLang="en-US" b="0" dirty="0">
+                <a:ea typeface="標楷體" panose="03000509000000000000" pitchFamily="65" charset="-120"/>
+              </a:rPr>
+              <a:t> </a:t>
+            </a:r>
+            <a:r>
               <a:rPr lang="en-US" altLang="zh-TW" b="0" dirty="0" smtClean="0">
                 <a:ea typeface="標楷體" panose="03000509000000000000" pitchFamily="65" charset="-120"/>
               </a:rPr>
-              <a:t>Submission</a:t>
-            </a:r>
+              <a:t>Strategy</a:t>
+            </a:r>
+          </a:p>
+          <a:p>
+            <a:pPr marL="882650" lvl="1" indent="-457200"/>
+            <a:r>
+              <a:rPr lang="en-US" altLang="zh-TW" dirty="0" err="1" smtClean="0">
+                <a:ea typeface="標楷體" panose="03000509000000000000" pitchFamily="65" charset="-120"/>
+              </a:rPr>
+              <a:t>AAT_demo</a:t>
+            </a:r>
+            <a:r>
+              <a:rPr lang="en-US" altLang="zh-TW" dirty="0" smtClean="0">
+                <a:ea typeface="標楷體" panose="03000509000000000000" pitchFamily="65" charset="-120"/>
+              </a:rPr>
+              <a:t>\</a:t>
+            </a:r>
+            <a:r>
+              <a:rPr lang="en-US" altLang="zh-TW" dirty="0" err="1" smtClean="0">
+                <a:ea typeface="標楷體" panose="03000509000000000000" pitchFamily="65" charset="-120"/>
+              </a:rPr>
+              <a:t>pricingEngine</a:t>
+            </a:r>
+            <a:r>
+              <a:rPr lang="en-US" altLang="zh-TW" dirty="0" smtClean="0">
+                <a:ea typeface="標楷體" panose="03000509000000000000" pitchFamily="65" charset="-120"/>
+              </a:rPr>
+              <a:t>\pricingengine.cpp</a:t>
+            </a:r>
+          </a:p>
+          <a:p>
+            <a:pPr marL="882650" lvl="1" indent="-457200"/>
+            <a:r>
+              <a:rPr lang="en-US" dirty="0" err="1" smtClean="0"/>
+              <a:t>pricingStrategyLimit</a:t>
+            </a:r>
+            <a:endParaRPr lang="en-US" dirty="0" smtClean="0"/>
+          </a:p>
+          <a:p>
+            <a:pPr marL="882650" lvl="1" indent="-457200"/>
+            <a:endParaRPr lang="en-US" dirty="0"/>
+          </a:p>
+          <a:p>
+            <a:pPr marL="882650" lvl="1" indent="-457200"/>
+            <a:endParaRPr lang="en-US" dirty="0" smtClean="0"/>
+          </a:p>
+          <a:p>
+            <a:pPr marL="882650" lvl="1" indent="-457200"/>
+            <a:endParaRPr lang="en-US" dirty="0" smtClean="0"/>
           </a:p>
           <a:p>
             <a:pPr marL="425450" lvl="1" indent="0">
               <a:buNone/>
             </a:pPr>
-            <a:r>
-              <a:rPr lang="en-US" altLang="zh-TW" b="0" dirty="0" err="1" smtClean="0">
-                <a:ea typeface="標楷體" panose="03000509000000000000" pitchFamily="65" charset="-120"/>
-              </a:rPr>
-              <a:t>StudentID_Lab_AAT</a:t>
-            </a:r>
-            <a:r>
-              <a:rPr lang="en-US" altLang="zh-TW" b="0" dirty="0" smtClean="0">
-                <a:ea typeface="標楷體" panose="03000509000000000000" pitchFamily="65" charset="-120"/>
-              </a:rPr>
-              <a:t>/</a:t>
-            </a:r>
-          </a:p>
-          <a:p>
-            <a:pPr marL="889000" lvl="2" indent="0">
-              <a:buNone/>
-            </a:pPr>
-            <a:r>
-              <a:rPr lang="en-US" altLang="zh-TW" sz="2800" b="0" dirty="0" smtClean="0">
-                <a:ea typeface="標楷體" panose="03000509000000000000" pitchFamily="65" charset="-120"/>
-              </a:rPr>
-              <a:t>Output.log</a:t>
-            </a:r>
-          </a:p>
-          <a:p>
-            <a:pPr marL="889000" lvl="2" indent="0">
-              <a:buNone/>
-            </a:pPr>
-            <a:r>
-              <a:rPr lang="en-US" altLang="zh-TW" sz="2800" dirty="0" smtClean="0">
-                <a:ea typeface="標楷體" panose="03000509000000000000" pitchFamily="65" charset="-120"/>
-              </a:rPr>
-              <a:t>StudentID_Report.pdf</a:t>
-            </a:r>
-          </a:p>
-          <a:p>
-            <a:pPr marL="44450" indent="0" algn="just">
-              <a:buNone/>
-            </a:pPr>
-            <a:r>
-              <a:rPr lang="en-US" altLang="zh-TW" sz="2800" dirty="0">
-                <a:solidFill>
-                  <a:srgbClr val="333333"/>
-                </a:solidFill>
-                <a:ea typeface="標楷體" panose="03000509000000000000" pitchFamily="65" charset="-120"/>
-              </a:rPr>
-              <a:t>   </a:t>
-            </a:r>
-            <a:r>
-              <a:rPr lang="en-US" altLang="zh-TW" sz="2800" b="0" dirty="0">
-                <a:solidFill>
-                  <a:srgbClr val="333333"/>
-                </a:solidFill>
-                <a:ea typeface="標楷體" panose="03000509000000000000" pitchFamily="65" charset="-120"/>
-              </a:rPr>
-              <a:t>※Compress all above files in a single zip file named StudentID_Lab_AAT.zip</a:t>
-            </a:r>
+            <a:endParaRPr lang="en-US" dirty="0" smtClean="0"/>
           </a:p>
           <a:p>
             <a:pPr marL="501650" indent="-457200"/>
-            <a:endParaRPr lang="en-US" altLang="zh-TW" b="0" dirty="0" smtClean="0">
-              <a:solidFill>
-                <a:srgbClr val="660066"/>
-              </a:solidFill>
-              <a:ea typeface="標楷體" panose="03000509000000000000" pitchFamily="65" charset="-120"/>
-            </a:endParaRPr>
-          </a:p>
-          <a:p>
-            <a:pPr marL="501650" indent="-457200"/>
-            <a:r>
-              <a:rPr lang="en-US" altLang="zh-TW" b="0" dirty="0" smtClean="0">
-                <a:solidFill>
-                  <a:srgbClr val="660066"/>
-                </a:solidFill>
-                <a:ea typeface="標楷體" panose="03000509000000000000" pitchFamily="65" charset="-120"/>
-              </a:rPr>
-              <a:t>Due: 2022/5/</a:t>
-            </a:r>
-            <a:endParaRPr lang="en-US" altLang="zh-TW" b="0" dirty="0">
-              <a:solidFill>
-                <a:srgbClr val="660066"/>
-              </a:solidFill>
-              <a:ea typeface="標楷體" panose="03000509000000000000" pitchFamily="65" charset="-120"/>
-            </a:endParaRPr>
-          </a:p>
-          <a:p>
-            <a:pPr marL="501650" lvl="1" indent="0">
-              <a:buNone/>
-            </a:pPr>
-            <a:endParaRPr lang="en-US" altLang="zh-TW" sz="3200" dirty="0" smtClean="0">
+            <a:r>
+              <a:rPr lang="en-US" b="0" dirty="0"/>
+              <a:t>Run C </a:t>
+            </a:r>
+            <a:r>
+              <a:rPr lang="en-US" b="0" dirty="0" smtClean="0"/>
+              <a:t>simulation</a:t>
+            </a:r>
+            <a:endParaRPr lang="en-US" b="0" dirty="0"/>
+          </a:p>
+          <a:p>
+            <a:pPr marL="882650" lvl="1" indent="-457200"/>
+            <a:endParaRPr lang="en-US" dirty="0"/>
+          </a:p>
+          <a:p>
+            <a:pPr marL="882650" lvl="1" indent="-457200"/>
+            <a:endParaRPr lang="en-US" altLang="zh-TW" dirty="0" smtClean="0">
               <a:ea typeface="標楷體" panose="03000509000000000000" pitchFamily="65" charset="-120"/>
             </a:endParaRPr>
           </a:p>
@@ -10389,6 +10474,809 @@
               <a:rPr lang="zh-TW" altLang="en-US" smtClean="0"/>
               <a:pPr/>
               <a:t>26</a:t>
+            </a:fld>
+            <a:endParaRPr lang="en-US" altLang="zh-TW" dirty="0"/>
+          </a:p>
+        </p:txBody>
+      </p:sp>
+      <p:pic>
+        <p:nvPicPr>
+          <p:cNvPr id="7" name="圖片 6"/>
+          <p:cNvPicPr>
+            <a:picLocks noChangeAspect="1"/>
+          </p:cNvPicPr>
+          <p:nvPr/>
+        </p:nvPicPr>
+        <p:blipFill>
+          <a:blip r:embed="rId2"/>
+          <a:stretch>
+            <a:fillRect/>
+          </a:stretch>
+        </p:blipFill>
+        <p:spPr>
+          <a:xfrm>
+            <a:off x="3865325" y="3125157"/>
+            <a:ext cx="4797315" cy="2063750"/>
+          </a:xfrm>
+          <a:prstGeom prst="rect">
+            <a:avLst/>
+          </a:prstGeom>
+        </p:spPr>
+      </p:pic>
+      <p:pic>
+        <p:nvPicPr>
+          <p:cNvPr id="12" name="圖片 11"/>
+          <p:cNvPicPr>
+            <a:picLocks noChangeAspect="1"/>
+          </p:cNvPicPr>
+          <p:nvPr/>
+        </p:nvPicPr>
+        <p:blipFill>
+          <a:blip r:embed="rId3"/>
+          <a:stretch>
+            <a:fillRect/>
+          </a:stretch>
+        </p:blipFill>
+        <p:spPr>
+          <a:xfrm>
+            <a:off x="1564590" y="7181056"/>
+            <a:ext cx="9812119" cy="1066949"/>
+          </a:xfrm>
+          <a:prstGeom prst="rect">
+            <a:avLst/>
+          </a:prstGeom>
+        </p:spPr>
+      </p:pic>
+      <p:sp>
+        <p:nvSpPr>
+          <p:cNvPr id="13" name="矩形 12"/>
+          <p:cNvSpPr/>
+          <p:nvPr/>
+        </p:nvSpPr>
+        <p:spPr>
+          <a:xfrm>
+            <a:off x="1551890" y="8384678"/>
+            <a:ext cx="7920880" cy="461665"/>
+          </a:xfrm>
+          <a:prstGeom prst="rect">
+            <a:avLst/>
+          </a:prstGeom>
+          <a:solidFill>
+            <a:schemeClr val="tx1"/>
+          </a:solidFill>
+        </p:spPr>
+        <p:txBody>
+          <a:bodyPr wrap="square">
+            <a:spAutoFit/>
+          </a:bodyPr>
+          <a:lstStyle/>
+          <a:p>
+            <a:r>
+              <a:rPr lang="en-US" dirty="0">
+                <a:solidFill>
+                  <a:schemeClr val="bg1"/>
+                </a:solidFill>
+              </a:rPr>
+              <a:t>ORDER_ENTRY_OPERATION: {0,0,1,800,5853400,0}</a:t>
+            </a:r>
+          </a:p>
+        </p:txBody>
+      </p:sp>
+      <p:sp>
+        <p:nvSpPr>
+          <p:cNvPr id="15" name="矩形 14"/>
+          <p:cNvSpPr/>
+          <p:nvPr/>
+        </p:nvSpPr>
+        <p:spPr>
+          <a:xfrm>
+            <a:off x="3743702" y="5986534"/>
+            <a:ext cx="5040560" cy="830997"/>
+          </a:xfrm>
+          <a:prstGeom prst="rect">
+            <a:avLst/>
+          </a:prstGeom>
+          <a:ln>
+            <a:solidFill>
+              <a:schemeClr val="tx1"/>
+            </a:solidFill>
+          </a:ln>
+        </p:spPr>
+        <p:txBody>
+          <a:bodyPr wrap="square">
+            <a:spAutoFit/>
+          </a:bodyPr>
+          <a:lstStyle/>
+          <a:p>
+            <a:r>
+              <a:rPr lang="en-US" dirty="0" smtClean="0"/>
+              <a:t>$ </a:t>
+            </a:r>
+            <a:r>
+              <a:rPr lang="en-US" dirty="0"/>
+              <a:t>cd </a:t>
+            </a:r>
+            <a:r>
+              <a:rPr lang="en-US" dirty="0" err="1"/>
+              <a:t>AAT_demo</a:t>
+            </a:r>
+            <a:r>
+              <a:rPr lang="en-US" dirty="0"/>
+              <a:t>/</a:t>
+            </a:r>
+            <a:r>
+              <a:rPr lang="en-US" dirty="0" err="1"/>
+              <a:t>pricingEngine</a:t>
+            </a:r>
+            <a:r>
+              <a:rPr lang="en-US" dirty="0"/>
+              <a:t>/test/</a:t>
+            </a:r>
+          </a:p>
+          <a:p>
+            <a:r>
+              <a:rPr lang="en-US" dirty="0" smtClean="0"/>
+              <a:t>$ </a:t>
+            </a:r>
+            <a:r>
+              <a:rPr lang="en-US" dirty="0"/>
+              <a:t>make</a:t>
+            </a:r>
+          </a:p>
+        </p:txBody>
+      </p:sp>
+    </p:spTree>
+    <p:extLst>
+      <p:ext uri="{BB962C8B-B14F-4D97-AF65-F5344CB8AC3E}">
+        <p14:creationId xmlns:p14="http://schemas.microsoft.com/office/powerpoint/2010/main" val="2418744524"/>
+      </p:ext>
+    </p:extLst>
+  </p:cSld>
+  <p:clrMapOvr>
+    <a:masterClrMapping/>
+  </p:clrMapOvr>
+  <p:transition/>
+</p:sld>
+</file>
+
+<file path=ppt/slides/slide27.xml><?xml version="1.0" encoding="utf-8"?>
+<p:sld xmlns:a="http://schemas.openxmlformats.org/drawingml/2006/main" xmlns:r="http://schemas.openxmlformats.org/officeDocument/2006/relationships" xmlns:p="http://schemas.openxmlformats.org/presentationml/2006/main">
+  <p:cSld>
+    <p:spTree>
+      <p:nvGrpSpPr>
+        <p:cNvPr id="1" name=""/>
+        <p:cNvGrpSpPr/>
+        <p:nvPr/>
+      </p:nvGrpSpPr>
+      <p:grpSpPr>
+        <a:xfrm>
+          <a:off x="0" y="0"/>
+          <a:ext cx="0" cy="0"/>
+          <a:chOff x="0" y="0"/>
+          <a:chExt cx="0" cy="0"/>
+        </a:xfrm>
+      </p:grpSpPr>
+      <p:sp>
+        <p:nvSpPr>
+          <p:cNvPr id="2" name="標題 1">
+            <a:extLst>
+              <a:ext uri="{FF2B5EF4-FFF2-40B4-BE49-F238E27FC236}">
+                <a16:creationId xmlns:a16="http://schemas.microsoft.com/office/drawing/2014/main" id="{DF590214-AB74-4E22-8A85-9C5D4C432A96}"/>
+              </a:ext>
+            </a:extLst>
+          </p:cNvPr>
+          <p:cNvSpPr>
+            <a:spLocks noGrp="1"/>
+          </p:cNvSpPr>
+          <p:nvPr>
+            <p:ph type="title"/>
+          </p:nvPr>
+        </p:nvSpPr>
+        <p:spPr/>
+        <p:txBody>
+          <a:bodyPr/>
+          <a:lstStyle/>
+          <a:p>
+            <a:r>
+              <a:rPr lang="en-US" altLang="zh-TW" dirty="0">
+                <a:ea typeface="標楷體" panose="03000509000000000000" pitchFamily="65" charset="-120"/>
+              </a:rPr>
+              <a:t>Lab</a:t>
+            </a:r>
+          </a:p>
+        </p:txBody>
+      </p:sp>
+      <p:sp>
+        <p:nvSpPr>
+          <p:cNvPr id="3" name="內容版面配置區 2">
+            <a:extLst>
+              <a:ext uri="{FF2B5EF4-FFF2-40B4-BE49-F238E27FC236}">
+                <a16:creationId xmlns:a16="http://schemas.microsoft.com/office/drawing/2014/main" id="{EB7E6C77-ECDF-4E94-86C3-FC66F6D05EF7}"/>
+              </a:ext>
+            </a:extLst>
+          </p:cNvPr>
+          <p:cNvSpPr>
+            <a:spLocks noGrp="1"/>
+          </p:cNvSpPr>
+          <p:nvPr>
+            <p:ph idx="1"/>
+          </p:nvPr>
+        </p:nvSpPr>
+        <p:spPr/>
+        <p:txBody>
+          <a:bodyPr/>
+          <a:lstStyle/>
+          <a:p>
+            <a:pPr marL="415925" lvl="1" indent="-371475">
+              <a:spcBef>
+                <a:spcPts val="1100"/>
+              </a:spcBef>
+              <a:buClrTx/>
+              <a:buFont typeface="Palatino" charset="0"/>
+              <a:buChar char="•"/>
+            </a:pPr>
+            <a:r>
+              <a:rPr lang="en-US" sz="3200" dirty="0" err="1">
+                <a:solidFill>
+                  <a:srgbClr val="660066"/>
+                </a:solidFill>
+                <a:ea typeface="標楷體" panose="03000509000000000000" pitchFamily="65" charset="-120"/>
+              </a:rPr>
+              <a:t>AAT_demo</a:t>
+            </a:r>
+            <a:r>
+              <a:rPr lang="en-US" sz="3200" dirty="0">
+                <a:solidFill>
+                  <a:srgbClr val="660066"/>
+                </a:solidFill>
+                <a:ea typeface="標楷體" panose="03000509000000000000" pitchFamily="65" charset="-120"/>
+              </a:rPr>
+              <a:t>/</a:t>
+            </a:r>
+            <a:r>
+              <a:rPr lang="en-US" sz="3200" dirty="0" err="1">
+                <a:solidFill>
+                  <a:srgbClr val="660066"/>
+                </a:solidFill>
+                <a:ea typeface="標楷體" panose="03000509000000000000" pitchFamily="65" charset="-120"/>
+              </a:rPr>
+              <a:t>pricingEngine</a:t>
+            </a:r>
+            <a:r>
+              <a:rPr lang="en-US" sz="3200" dirty="0">
+                <a:solidFill>
+                  <a:srgbClr val="660066"/>
+                </a:solidFill>
+                <a:ea typeface="標楷體" panose="03000509000000000000" pitchFamily="65" charset="-120"/>
+              </a:rPr>
+              <a:t>/test/</a:t>
+            </a:r>
+            <a:r>
+              <a:rPr lang="en-US" altLang="zh-TW" sz="3200" dirty="0">
+                <a:solidFill>
+                  <a:srgbClr val="660066"/>
+                </a:solidFill>
+                <a:ea typeface="標楷體" panose="03000509000000000000" pitchFamily="65" charset="-120"/>
+              </a:rPr>
+              <a:t>tb_pricingengine.cpp</a:t>
+            </a:r>
+          </a:p>
+          <a:p>
+            <a:endParaRPr lang="en-US" b="0" dirty="0" smtClean="0"/>
+          </a:p>
+          <a:p>
+            <a:endParaRPr lang="en-US" b="0" dirty="0" smtClean="0"/>
+          </a:p>
+          <a:p>
+            <a:r>
+              <a:rPr lang="en-US" b="0" dirty="0" err="1" smtClean="0">
+                <a:ea typeface="標楷體" panose="03000509000000000000" pitchFamily="65" charset="-120"/>
+              </a:rPr>
+              <a:t>AAT_demo</a:t>
+            </a:r>
+            <a:r>
+              <a:rPr lang="en-US" b="0" dirty="0" smtClean="0">
+                <a:ea typeface="標楷體" panose="03000509000000000000" pitchFamily="65" charset="-120"/>
+              </a:rPr>
+              <a:t>/</a:t>
+            </a:r>
+            <a:r>
+              <a:rPr lang="en-US" b="0" dirty="0" err="1" smtClean="0">
+                <a:ea typeface="標楷體" panose="03000509000000000000" pitchFamily="65" charset="-120"/>
+              </a:rPr>
+              <a:t>aat_host</a:t>
+            </a:r>
+            <a:r>
+              <a:rPr lang="en-US" b="0" dirty="0" smtClean="0">
+                <a:ea typeface="標楷體" panose="03000509000000000000" pitchFamily="65" charset="-120"/>
+              </a:rPr>
+              <a:t>/host.cpp</a:t>
+            </a:r>
+          </a:p>
+          <a:p>
+            <a:endParaRPr lang="en-US" b="0" dirty="0">
+              <a:ea typeface="標楷體" panose="03000509000000000000" pitchFamily="65" charset="-120"/>
+            </a:endParaRPr>
+          </a:p>
+          <a:p>
+            <a:endParaRPr lang="en-US" b="0" dirty="0" smtClean="0">
+              <a:ea typeface="標楷體" panose="03000509000000000000" pitchFamily="65" charset="-120"/>
+            </a:endParaRPr>
+          </a:p>
+          <a:p>
+            <a:endParaRPr lang="en-US" b="0" dirty="0" smtClean="0">
+              <a:ea typeface="標楷體" panose="03000509000000000000" pitchFamily="65" charset="-120"/>
+            </a:endParaRPr>
+          </a:p>
+          <a:p>
+            <a:r>
+              <a:rPr lang="en-US" b="0" dirty="0" smtClean="0"/>
+              <a:t>HW result</a:t>
+            </a:r>
+          </a:p>
+          <a:p>
+            <a:pPr lvl="1"/>
+            <a:r>
+              <a:rPr lang="en-US" dirty="0" err="1" smtClean="0">
+                <a:ea typeface="標楷體" panose="03000509000000000000" pitchFamily="65" charset="-120"/>
+              </a:rPr>
+              <a:t>Orderbook</a:t>
+            </a:r>
+            <a:r>
+              <a:rPr lang="en-US" dirty="0" smtClean="0">
+                <a:ea typeface="標楷體" panose="03000509000000000000" pitchFamily="65" charset="-120"/>
+              </a:rPr>
+              <a:t> log</a:t>
+            </a:r>
+            <a:endParaRPr lang="en-US" b="0" dirty="0">
+              <a:ea typeface="標楷體" panose="03000509000000000000" pitchFamily="65" charset="-120"/>
+            </a:endParaRPr>
+          </a:p>
+        </p:txBody>
+      </p:sp>
+      <p:sp>
+        <p:nvSpPr>
+          <p:cNvPr id="4" name="投影片編號版面配置區 3">
+            <a:extLst>
+              <a:ext uri="{FF2B5EF4-FFF2-40B4-BE49-F238E27FC236}">
+                <a16:creationId xmlns:a16="http://schemas.microsoft.com/office/drawing/2014/main" id="{3B906199-CFB1-4D93-96DA-F79EF75407F2}"/>
+              </a:ext>
+            </a:extLst>
+          </p:cNvPr>
+          <p:cNvSpPr>
+            <a:spLocks noGrp="1"/>
+          </p:cNvSpPr>
+          <p:nvPr>
+            <p:ph type="sldNum" sz="quarter" idx="10"/>
+          </p:nvPr>
+        </p:nvSpPr>
+        <p:spPr/>
+        <p:txBody>
+          <a:bodyPr/>
+          <a:lstStyle/>
+          <a:p>
+            <a:fld id="{11B4AD68-C2A9-40CE-B4DE-8329351EC16B}" type="slidenum">
+              <a:rPr lang="zh-TW" altLang="en-US" smtClean="0"/>
+              <a:pPr/>
+              <a:t>27</a:t>
+            </a:fld>
+            <a:endParaRPr lang="en-US" altLang="zh-TW" dirty="0"/>
+          </a:p>
+        </p:txBody>
+      </p:sp>
+      <p:pic>
+        <p:nvPicPr>
+          <p:cNvPr id="5" name="圖片 4"/>
+          <p:cNvPicPr>
+            <a:picLocks noChangeAspect="1"/>
+          </p:cNvPicPr>
+          <p:nvPr/>
+        </p:nvPicPr>
+        <p:blipFill>
+          <a:blip r:embed="rId2"/>
+          <a:stretch>
+            <a:fillRect/>
+          </a:stretch>
+        </p:blipFill>
+        <p:spPr>
+          <a:xfrm>
+            <a:off x="391113" y="7115279"/>
+            <a:ext cx="10008000" cy="673684"/>
+          </a:xfrm>
+          <a:prstGeom prst="rect">
+            <a:avLst/>
+          </a:prstGeom>
+        </p:spPr>
+      </p:pic>
+      <p:pic>
+        <p:nvPicPr>
+          <p:cNvPr id="6" name="圖片 5"/>
+          <p:cNvPicPr>
+            <a:picLocks noChangeAspect="1"/>
+          </p:cNvPicPr>
+          <p:nvPr/>
+        </p:nvPicPr>
+        <p:blipFill rotWithShape="1">
+          <a:blip r:embed="rId3"/>
+          <a:srcRect b="35784"/>
+          <a:stretch/>
+        </p:blipFill>
+        <p:spPr>
+          <a:xfrm>
+            <a:off x="10493230" y="5274121"/>
+            <a:ext cx="1986108" cy="4356000"/>
+          </a:xfrm>
+          <a:prstGeom prst="rect">
+            <a:avLst/>
+          </a:prstGeom>
+        </p:spPr>
+      </p:pic>
+      <p:pic>
+        <p:nvPicPr>
+          <p:cNvPr id="15" name="圖片 14"/>
+          <p:cNvPicPr>
+            <a:picLocks noChangeAspect="1"/>
+          </p:cNvPicPr>
+          <p:nvPr/>
+        </p:nvPicPr>
+        <p:blipFill>
+          <a:blip r:embed="rId4"/>
+          <a:stretch>
+            <a:fillRect/>
+          </a:stretch>
+        </p:blipFill>
+        <p:spPr>
+          <a:xfrm>
+            <a:off x="2636301" y="4024738"/>
+            <a:ext cx="7668695" cy="1247949"/>
+          </a:xfrm>
+          <a:prstGeom prst="rect">
+            <a:avLst/>
+          </a:prstGeom>
+        </p:spPr>
+      </p:pic>
+      <p:pic>
+        <p:nvPicPr>
+          <p:cNvPr id="16" name="圖片 15"/>
+          <p:cNvPicPr>
+            <a:picLocks noChangeAspect="1"/>
+          </p:cNvPicPr>
+          <p:nvPr/>
+        </p:nvPicPr>
+        <p:blipFill>
+          <a:blip r:embed="rId5"/>
+          <a:stretch>
+            <a:fillRect/>
+          </a:stretch>
+        </p:blipFill>
+        <p:spPr>
+          <a:xfrm>
+            <a:off x="3653514" y="2153419"/>
+            <a:ext cx="5634271" cy="845141"/>
+          </a:xfrm>
+          <a:prstGeom prst="rect">
+            <a:avLst/>
+          </a:prstGeom>
+        </p:spPr>
+      </p:pic>
+    </p:spTree>
+    <p:extLst>
+      <p:ext uri="{BB962C8B-B14F-4D97-AF65-F5344CB8AC3E}">
+        <p14:creationId xmlns:p14="http://schemas.microsoft.com/office/powerpoint/2010/main" val="1059751156"/>
+      </p:ext>
+    </p:extLst>
+  </p:cSld>
+  <p:clrMapOvr>
+    <a:masterClrMapping/>
+  </p:clrMapOvr>
+  <p:transition/>
+</p:sld>
+</file>
+
+<file path=ppt/slides/slide28.xml><?xml version="1.0" encoding="utf-8"?>
+<p:sld xmlns:a="http://schemas.openxmlformats.org/drawingml/2006/main" xmlns:r="http://schemas.openxmlformats.org/officeDocument/2006/relationships" xmlns:p="http://schemas.openxmlformats.org/presentationml/2006/main">
+  <p:cSld>
+    <p:spTree>
+      <p:nvGrpSpPr>
+        <p:cNvPr id="1" name=""/>
+        <p:cNvGrpSpPr/>
+        <p:nvPr/>
+      </p:nvGrpSpPr>
+      <p:grpSpPr>
+        <a:xfrm>
+          <a:off x="0" y="0"/>
+          <a:ext cx="0" cy="0"/>
+          <a:chOff x="0" y="0"/>
+          <a:chExt cx="0" cy="0"/>
+        </a:xfrm>
+      </p:grpSpPr>
+      <p:sp>
+        <p:nvSpPr>
+          <p:cNvPr id="2" name="標題 1">
+            <a:extLst>
+              <a:ext uri="{FF2B5EF4-FFF2-40B4-BE49-F238E27FC236}">
+                <a16:creationId xmlns:a16="http://schemas.microsoft.com/office/drawing/2014/main" id="{DF590214-AB74-4E22-8A85-9C5D4C432A96}"/>
+              </a:ext>
+            </a:extLst>
+          </p:cNvPr>
+          <p:cNvSpPr>
+            <a:spLocks noGrp="1"/>
+          </p:cNvSpPr>
+          <p:nvPr>
+            <p:ph type="title"/>
+          </p:nvPr>
+        </p:nvSpPr>
+        <p:spPr/>
+        <p:txBody>
+          <a:bodyPr/>
+          <a:lstStyle/>
+          <a:p>
+            <a:r>
+              <a:rPr lang="en-US" altLang="zh-TW" dirty="0">
+                <a:ea typeface="標楷體" panose="03000509000000000000" pitchFamily="65" charset="-120"/>
+              </a:rPr>
+              <a:t>Lab</a:t>
+            </a:r>
+          </a:p>
+        </p:txBody>
+      </p:sp>
+      <p:sp>
+        <p:nvSpPr>
+          <p:cNvPr id="3" name="內容版面配置區 2">
+            <a:extLst>
+              <a:ext uri="{FF2B5EF4-FFF2-40B4-BE49-F238E27FC236}">
+                <a16:creationId xmlns:a16="http://schemas.microsoft.com/office/drawing/2014/main" id="{EB7E6C77-ECDF-4E94-86C3-FC66F6D05EF7}"/>
+              </a:ext>
+            </a:extLst>
+          </p:cNvPr>
+          <p:cNvSpPr>
+            <a:spLocks noGrp="1"/>
+          </p:cNvSpPr>
+          <p:nvPr>
+            <p:ph idx="1"/>
+          </p:nvPr>
+        </p:nvSpPr>
+        <p:spPr>
+          <a:xfrm>
+            <a:off x="457200" y="1348408"/>
+            <a:ext cx="12022138" cy="7992888"/>
+          </a:xfrm>
+        </p:spPr>
+        <p:txBody>
+          <a:bodyPr/>
+          <a:lstStyle/>
+          <a:p>
+            <a:r>
+              <a:rPr lang="en-US" altLang="zh-TW" b="0" dirty="0">
+                <a:ea typeface="標楷體" panose="03000509000000000000" pitchFamily="65" charset="-120"/>
+              </a:rPr>
+              <a:t>Build</a:t>
+            </a:r>
+            <a:r>
+              <a:rPr lang="zh-TW" altLang="en-US" b="0" dirty="0">
+                <a:ea typeface="標楷體" panose="03000509000000000000" pitchFamily="65" charset="-120"/>
+              </a:rPr>
+              <a:t> </a:t>
+            </a:r>
+            <a:r>
+              <a:rPr lang="en-US" altLang="zh-TW" b="0" dirty="0">
+                <a:ea typeface="標楷體" panose="03000509000000000000" pitchFamily="65" charset="-120"/>
+              </a:rPr>
+              <a:t>&amp;</a:t>
+            </a:r>
+            <a:r>
+              <a:rPr lang="zh-TW" altLang="en-US" b="0" dirty="0">
+                <a:ea typeface="標楷體" panose="03000509000000000000" pitchFamily="65" charset="-120"/>
+              </a:rPr>
+              <a:t> </a:t>
+            </a:r>
+            <a:r>
+              <a:rPr lang="en-US" altLang="zh-TW" b="0" dirty="0">
+                <a:ea typeface="標楷體" panose="03000509000000000000" pitchFamily="65" charset="-120"/>
+              </a:rPr>
+              <a:t>Run</a:t>
+            </a:r>
+          </a:p>
+          <a:p>
+            <a:pPr lvl="1"/>
+            <a:r>
+              <a:rPr lang="en-US" altLang="zh-TW" dirty="0">
+                <a:ea typeface="標楷體" panose="03000509000000000000" pitchFamily="65" charset="-120"/>
+              </a:rPr>
+              <a:t>./run.sh &gt;&gt; output.log</a:t>
+            </a:r>
+          </a:p>
+          <a:p>
+            <a:r>
+              <a:rPr lang="en-US" altLang="zh-TW" b="0" dirty="0" smtClean="0">
+                <a:ea typeface="標楷體" panose="03000509000000000000" pitchFamily="65" charset="-120"/>
+              </a:rPr>
+              <a:t>Report</a:t>
+            </a:r>
+          </a:p>
+          <a:p>
+            <a:pPr lvl="1"/>
+            <a:r>
+              <a:rPr lang="en-US" altLang="zh-TW" dirty="0" smtClean="0">
+                <a:ea typeface="標楷體" panose="03000509000000000000" pitchFamily="65" charset="-120"/>
+              </a:rPr>
+              <a:t>Code modification</a:t>
+            </a:r>
+          </a:p>
+          <a:p>
+            <a:pPr lvl="1"/>
+            <a:r>
+              <a:rPr lang="en-US" altLang="zh-TW" b="0" dirty="0" smtClean="0">
+                <a:ea typeface="標楷體" panose="03000509000000000000" pitchFamily="65" charset="-120"/>
+              </a:rPr>
+              <a:t>Result </a:t>
+            </a:r>
+            <a:r>
+              <a:rPr lang="en-US" dirty="0"/>
+              <a:t>analyze</a:t>
+            </a:r>
+            <a:endParaRPr lang="en-US" altLang="zh-TW" b="0" dirty="0">
+              <a:ea typeface="標楷體" panose="03000509000000000000" pitchFamily="65" charset="-120"/>
+            </a:endParaRPr>
+          </a:p>
+          <a:p>
+            <a:r>
+              <a:rPr lang="en-US" altLang="zh-TW" b="0" dirty="0" smtClean="0">
+                <a:ea typeface="標楷體" panose="03000509000000000000" pitchFamily="65" charset="-120"/>
+              </a:rPr>
+              <a:t>Submission</a:t>
+            </a:r>
+          </a:p>
+          <a:p>
+            <a:pPr marL="425450" lvl="1" indent="0">
+              <a:buNone/>
+            </a:pPr>
+            <a:r>
+              <a:rPr lang="en-US" altLang="zh-TW" b="0" dirty="0" err="1" smtClean="0">
+                <a:ea typeface="標楷體" panose="03000509000000000000" pitchFamily="65" charset="-120"/>
+              </a:rPr>
+              <a:t>StudentID_Lab_AAT</a:t>
+            </a:r>
+            <a:r>
+              <a:rPr lang="en-US" altLang="zh-TW" b="0" dirty="0" smtClean="0">
+                <a:ea typeface="標楷體" panose="03000509000000000000" pitchFamily="65" charset="-120"/>
+              </a:rPr>
+              <a:t>/</a:t>
+            </a:r>
+          </a:p>
+          <a:p>
+            <a:pPr marL="425450" lvl="1" indent="0">
+              <a:buNone/>
+            </a:pPr>
+            <a:r>
+              <a:rPr lang="en-US" altLang="zh-TW" dirty="0">
+                <a:ea typeface="標楷體" panose="03000509000000000000" pitchFamily="65" charset="-120"/>
+              </a:rPr>
+              <a:t>	</a:t>
+            </a:r>
+            <a:r>
+              <a:rPr lang="en-US" altLang="zh-TW" dirty="0" smtClean="0">
+                <a:ea typeface="標楷體" panose="03000509000000000000" pitchFamily="65" charset="-120"/>
+              </a:rPr>
+              <a:t>pricingengine.cpp</a:t>
+            </a:r>
+            <a:endParaRPr lang="en-US" altLang="zh-TW" b="0" dirty="0" smtClean="0">
+              <a:ea typeface="標楷體" panose="03000509000000000000" pitchFamily="65" charset="-120"/>
+            </a:endParaRPr>
+          </a:p>
+          <a:p>
+            <a:pPr marL="889000" lvl="2" indent="0">
+              <a:buNone/>
+            </a:pPr>
+            <a:r>
+              <a:rPr lang="en-US" altLang="zh-TW" sz="2800" b="0" dirty="0" smtClean="0">
+                <a:ea typeface="標楷體" panose="03000509000000000000" pitchFamily="65" charset="-120"/>
+              </a:rPr>
+              <a:t>Output.log</a:t>
+            </a:r>
+          </a:p>
+          <a:p>
+            <a:pPr marL="889000" lvl="2" indent="0">
+              <a:buNone/>
+            </a:pPr>
+            <a:r>
+              <a:rPr lang="en-US" altLang="zh-TW" sz="2800" dirty="0" smtClean="0">
+                <a:ea typeface="標楷體" panose="03000509000000000000" pitchFamily="65" charset="-120"/>
+              </a:rPr>
+              <a:t>StudentID_Report.pdf</a:t>
+            </a:r>
+          </a:p>
+          <a:p>
+            <a:pPr marL="44450" indent="0" algn="just">
+              <a:buNone/>
+            </a:pPr>
+            <a:r>
+              <a:rPr lang="en-US" altLang="zh-TW" sz="2800" dirty="0">
+                <a:solidFill>
+                  <a:srgbClr val="333333"/>
+                </a:solidFill>
+                <a:ea typeface="標楷體" panose="03000509000000000000" pitchFamily="65" charset="-120"/>
+              </a:rPr>
+              <a:t>   </a:t>
+            </a:r>
+            <a:r>
+              <a:rPr lang="en-US" altLang="zh-TW" sz="2800" b="0" dirty="0">
+                <a:solidFill>
+                  <a:srgbClr val="333333"/>
+                </a:solidFill>
+                <a:ea typeface="標楷體" panose="03000509000000000000" pitchFamily="65" charset="-120"/>
+              </a:rPr>
+              <a:t>※Compress all above files in a single zip file named </a:t>
+            </a:r>
+            <a:r>
+              <a:rPr lang="en-US" altLang="zh-TW" sz="2800" b="0" dirty="0" smtClean="0">
+                <a:solidFill>
+                  <a:srgbClr val="333333"/>
+                </a:solidFill>
+                <a:ea typeface="標楷體" panose="03000509000000000000" pitchFamily="65" charset="-120"/>
+              </a:rPr>
+              <a:t>StudentID_Lab_AAT.zip</a:t>
+            </a:r>
+            <a:endParaRPr lang="en-US" altLang="zh-TW" b="0" dirty="0" smtClean="0">
+              <a:solidFill>
+                <a:srgbClr val="660066"/>
+              </a:solidFill>
+              <a:ea typeface="標楷體" panose="03000509000000000000" pitchFamily="65" charset="-120"/>
+            </a:endParaRPr>
+          </a:p>
+          <a:p>
+            <a:pPr marL="501650" indent="-457200"/>
+            <a:r>
+              <a:rPr lang="en-US" altLang="zh-TW" b="0" dirty="0" smtClean="0">
+                <a:solidFill>
+                  <a:srgbClr val="660066"/>
+                </a:solidFill>
+                <a:ea typeface="標楷體" panose="03000509000000000000" pitchFamily="65" charset="-120"/>
+              </a:rPr>
+              <a:t>Due: 2022/6/24</a:t>
+            </a:r>
+            <a:endParaRPr lang="en-US" altLang="zh-TW" b="0" dirty="0">
+              <a:solidFill>
+                <a:srgbClr val="660066"/>
+              </a:solidFill>
+              <a:ea typeface="標楷體" panose="03000509000000000000" pitchFamily="65" charset="-120"/>
+            </a:endParaRPr>
+          </a:p>
+          <a:p>
+            <a:pPr marL="501650" lvl="1" indent="0">
+              <a:buNone/>
+            </a:pPr>
+            <a:endParaRPr lang="en-US" altLang="zh-TW" sz="3200" dirty="0" smtClean="0">
+              <a:ea typeface="標楷體" panose="03000509000000000000" pitchFamily="65" charset="-120"/>
+            </a:endParaRPr>
+          </a:p>
+        </p:txBody>
+      </p:sp>
+      <p:sp>
+        <p:nvSpPr>
+          <p:cNvPr id="4" name="投影片編號版面配置區 3">
+            <a:extLst>
+              <a:ext uri="{FF2B5EF4-FFF2-40B4-BE49-F238E27FC236}">
+                <a16:creationId xmlns:a16="http://schemas.microsoft.com/office/drawing/2014/main" id="{3B906199-CFB1-4D93-96DA-F79EF75407F2}"/>
+              </a:ext>
+            </a:extLst>
+          </p:cNvPr>
+          <p:cNvSpPr>
+            <a:spLocks noGrp="1"/>
+          </p:cNvSpPr>
+          <p:nvPr>
+            <p:ph type="sldNum" sz="quarter" idx="10"/>
+          </p:nvPr>
+        </p:nvSpPr>
+        <p:spPr/>
+        <p:txBody>
+          <a:bodyPr/>
+          <a:lstStyle/>
+          <a:p>
+            <a:fld id="{11B4AD68-C2A9-40CE-B4DE-8329351EC16B}" type="slidenum">
+              <a:rPr lang="zh-TW" altLang="en-US" smtClean="0"/>
+              <a:pPr/>
+              <a:t>28</a:t>
             </a:fld>
             <a:endParaRPr lang="en-US" altLang="zh-TW" dirty="0"/>
           </a:p>
@@ -10919,6 +11807,15 @@
               </a:rPr>
               <a:t>TCP/UDP/IP</a:t>
             </a:r>
+          </a:p>
+          <a:p>
+            <a:pPr lvl="1"/>
+            <a:r>
+              <a:rPr lang="en-US" altLang="zh-TW" dirty="0" err="1">
+                <a:ea typeface="標楷體" panose="03000509000000000000" pitchFamily="65" charset="-120"/>
+              </a:rPr>
+              <a:t>lineHandler</a:t>
+            </a:r>
             <a:endParaRPr lang="en-US" altLang="zh-TW" dirty="0">
               <a:ea typeface="標楷體" panose="03000509000000000000" pitchFamily="65" charset="-120"/>
             </a:endParaRPr>
@@ -10931,20 +11828,8 @@
               <a:t>Market </a:t>
             </a:r>
             <a:r>
-              <a:rPr lang="en-US" altLang="zh-TW" b="0" dirty="0"/>
+              <a:rPr lang="en-US" altLang="zh-TW" b="0" dirty="0" smtClean="0"/>
               <a:t>Kernel</a:t>
-            </a:r>
-            <a:endParaRPr lang="en-US" altLang="zh-TW" b="0" dirty="0">
-              <a:ea typeface="標楷體" panose="03000509000000000000" pitchFamily="65" charset="-120"/>
-            </a:endParaRPr>
-          </a:p>
-          <a:p>
-            <a:pPr lvl="1"/>
-            <a:r>
-              <a:rPr lang="en-US" altLang="zh-TW" dirty="0" err="1">
-                <a:ea typeface="標楷體" panose="03000509000000000000" pitchFamily="65" charset="-120"/>
-              </a:rPr>
-              <a:t>lineHandler</a:t>
             </a:r>
             <a:endParaRPr lang="en-US" altLang="zh-TW" dirty="0">
               <a:ea typeface="標楷體" panose="03000509000000000000" pitchFamily="65" charset="-120"/>

</xml_diff>